<commit_message>
Updates to powerpoint, changed to Daphnia
</commit_message>
<xml_diff>
--- a/PaperOutline_v1_2.pptx
+++ b/PaperOutline_v1_2.pptx
@@ -5,15 +5,16 @@
     <p:sldMasterId id="2147483648" r:id="rId1"/>
   </p:sldMasterIdLst>
   <p:notesMasterIdLst>
-    <p:notesMasterId r:id="rId8"/>
+    <p:notesMasterId r:id="rId9"/>
   </p:notesMasterIdLst>
   <p:sldIdLst>
     <p:sldId id="319" r:id="rId2"/>
     <p:sldId id="321" r:id="rId3"/>
     <p:sldId id="325" r:id="rId4"/>
     <p:sldId id="326" r:id="rId5"/>
-    <p:sldId id="323" r:id="rId6"/>
-    <p:sldId id="324" r:id="rId7"/>
+    <p:sldId id="327" r:id="rId6"/>
+    <p:sldId id="323" r:id="rId7"/>
+    <p:sldId id="324" r:id="rId8"/>
   </p:sldIdLst>
   <p:sldSz cx="12192000" cy="6858000"/>
   <p:notesSz cx="6858000" cy="9144000"/>
@@ -202,7 +203,7 @@
           <a:p>
             <a:fld id="{982D7E43-E401-43ED-ACCB-2C6410FE48A5}" type="datetimeFigureOut">
               <a:rPr lang="en-US" smtClean="0"/>
-              <a:t>7/28/2022</a:t>
+              <a:t>8/1/2022</a:t>
             </a:fld>
             <a:endParaRPr lang="en-US"/>
           </a:p>
@@ -703,7 +704,7 @@
           <a:p>
             <a:fld id="{C81EE8AC-7356-4E1A-8866-5ADEE4133E9C}" type="datetimeFigureOut">
               <a:rPr lang="en-US" smtClean="0"/>
-              <a:t>7/28/2022</a:t>
+              <a:t>8/1/2022</a:t>
             </a:fld>
             <a:endParaRPr lang="en-US"/>
           </a:p>
@@ -901,7 +902,7 @@
           <a:p>
             <a:fld id="{C81EE8AC-7356-4E1A-8866-5ADEE4133E9C}" type="datetimeFigureOut">
               <a:rPr lang="en-US" smtClean="0"/>
-              <a:t>7/28/2022</a:t>
+              <a:t>8/1/2022</a:t>
             </a:fld>
             <a:endParaRPr lang="en-US"/>
           </a:p>
@@ -1109,7 +1110,7 @@
           <a:p>
             <a:fld id="{C81EE8AC-7356-4E1A-8866-5ADEE4133E9C}" type="datetimeFigureOut">
               <a:rPr lang="en-US" smtClean="0"/>
-              <a:t>7/28/2022</a:t>
+              <a:t>8/1/2022</a:t>
             </a:fld>
             <a:endParaRPr lang="en-US"/>
           </a:p>
@@ -1307,7 +1308,7 @@
           <a:p>
             <a:fld id="{C81EE8AC-7356-4E1A-8866-5ADEE4133E9C}" type="datetimeFigureOut">
               <a:rPr lang="en-US" smtClean="0"/>
-              <a:t>7/28/2022</a:t>
+              <a:t>8/1/2022</a:t>
             </a:fld>
             <a:endParaRPr lang="en-US"/>
           </a:p>
@@ -1582,7 +1583,7 @@
           <a:p>
             <a:fld id="{C81EE8AC-7356-4E1A-8866-5ADEE4133E9C}" type="datetimeFigureOut">
               <a:rPr lang="en-US" smtClean="0"/>
-              <a:t>7/28/2022</a:t>
+              <a:t>8/1/2022</a:t>
             </a:fld>
             <a:endParaRPr lang="en-US"/>
           </a:p>
@@ -1847,7 +1848,7 @@
           <a:p>
             <a:fld id="{C81EE8AC-7356-4E1A-8866-5ADEE4133E9C}" type="datetimeFigureOut">
               <a:rPr lang="en-US" smtClean="0"/>
-              <a:t>7/28/2022</a:t>
+              <a:t>8/1/2022</a:t>
             </a:fld>
             <a:endParaRPr lang="en-US"/>
           </a:p>
@@ -2259,7 +2260,7 @@
           <a:p>
             <a:fld id="{C81EE8AC-7356-4E1A-8866-5ADEE4133E9C}" type="datetimeFigureOut">
               <a:rPr lang="en-US" smtClean="0"/>
-              <a:t>7/28/2022</a:t>
+              <a:t>8/1/2022</a:t>
             </a:fld>
             <a:endParaRPr lang="en-US"/>
           </a:p>
@@ -2400,7 +2401,7 @@
           <a:p>
             <a:fld id="{C81EE8AC-7356-4E1A-8866-5ADEE4133E9C}" type="datetimeFigureOut">
               <a:rPr lang="en-US" smtClean="0"/>
-              <a:t>7/28/2022</a:t>
+              <a:t>8/1/2022</a:t>
             </a:fld>
             <a:endParaRPr lang="en-US"/>
           </a:p>
@@ -2513,7 +2514,7 @@
           <a:p>
             <a:fld id="{C81EE8AC-7356-4E1A-8866-5ADEE4133E9C}" type="datetimeFigureOut">
               <a:rPr lang="en-US" smtClean="0"/>
-              <a:t>7/28/2022</a:t>
+              <a:t>8/1/2022</a:t>
             </a:fld>
             <a:endParaRPr lang="en-US"/>
           </a:p>
@@ -2824,7 +2825,7 @@
           <a:p>
             <a:fld id="{C81EE8AC-7356-4E1A-8866-5ADEE4133E9C}" type="datetimeFigureOut">
               <a:rPr lang="en-US" smtClean="0"/>
-              <a:t>7/28/2022</a:t>
+              <a:t>8/1/2022</a:t>
             </a:fld>
             <a:endParaRPr lang="en-US"/>
           </a:p>
@@ -3112,7 +3113,7 @@
           <a:p>
             <a:fld id="{C81EE8AC-7356-4E1A-8866-5ADEE4133E9C}" type="datetimeFigureOut">
               <a:rPr lang="en-US" smtClean="0"/>
-              <a:t>7/28/2022</a:t>
+              <a:t>8/1/2022</a:t>
             </a:fld>
             <a:endParaRPr lang="en-US"/>
           </a:p>
@@ -3353,7 +3354,7 @@
           <a:p>
             <a:fld id="{C81EE8AC-7356-4E1A-8866-5ADEE4133E9C}" type="datetimeFigureOut">
               <a:rPr lang="en-US" smtClean="0"/>
-              <a:t>7/28/2022</a:t>
+              <a:t>8/1/2022</a:t>
             </a:fld>
             <a:endParaRPr lang="en-US"/>
           </a:p>
@@ -3948,7 +3949,7 @@
         <p:spPr>
           <a:xfrm>
             <a:off x="7360445" y="165370"/>
-            <a:ext cx="4351507" cy="6527260"/>
+            <a:ext cx="4351506" cy="6527260"/>
           </a:xfrm>
           <a:prstGeom prst="rect">
             <a:avLst/>
@@ -5107,7 +5108,7 @@
         <p:spPr>
           <a:xfrm>
             <a:off x="259847" y="1217007"/>
-            <a:ext cx="5180504" cy="5262979"/>
+            <a:ext cx="5180504" cy="4893647"/>
           </a:xfrm>
           <a:prstGeom prst="rect">
             <a:avLst/>
@@ -5121,155 +5122,186 @@
           <a:lstStyle/>
           <a:p>
             <a:r>
-              <a:rPr lang="en-US" sz="1400" b="1" dirty="0"/>
+              <a:rPr lang="en-US" sz="1200" b="1" dirty="0"/>
               <a:t>Presence/Absence</a:t>
             </a:r>
-          </a:p>
-          <a:p>
-            <a:r>
-              <a:rPr lang="en-US" sz="1400" dirty="0"/>
+            <a:endParaRPr lang="en-US" sz="1200" dirty="0"/>
+          </a:p>
+          <a:p>
+            <a:r>
+              <a:rPr lang="en-US" sz="1200" dirty="0"/>
               <a:t>Call:</a:t>
             </a:r>
           </a:p>
           <a:p>
             <a:r>
-              <a:rPr lang="en-US" sz="1400" dirty="0" err="1"/>
+              <a:rPr lang="en-US" sz="1200" dirty="0" err="1"/>
               <a:t>glm</a:t>
             </a:r>
             <a:r>
-              <a:rPr lang="en-US" sz="1400" dirty="0"/>
-              <a:t>(formula = Presence ~ salinity + month, family = "binomial", </a:t>
-            </a:r>
-          </a:p>
-          <a:p>
-            <a:r>
-              <a:rPr lang="en-US" sz="1400" dirty="0"/>
+              <a:rPr lang="en-US" sz="1200" dirty="0"/>
+              <a:t>(formula = Presence ~ salinity + ns(month, </a:t>
+            </a:r>
+            <a:r>
+              <a:rPr lang="en-US" sz="1200" dirty="0" err="1"/>
+              <a:t>df</a:t>
+            </a:r>
+            <a:r>
+              <a:rPr lang="en-US" sz="1200" dirty="0"/>
+              <a:t> = 2), family = "binomial", </a:t>
+            </a:r>
+          </a:p>
+          <a:p>
+            <a:r>
+              <a:rPr lang="en-US" sz="1200" dirty="0"/>
               <a:t>    data = </a:t>
             </a:r>
             <a:r>
-              <a:rPr lang="en-US" sz="1400" dirty="0" err="1"/>
+              <a:rPr lang="en-US" sz="1200" dirty="0" err="1"/>
               <a:t>d_pa</a:t>
             </a:r>
             <a:r>
-              <a:rPr lang="en-US" sz="1400" dirty="0"/>
+              <a:rPr lang="en-US" sz="1200" dirty="0"/>
               <a:t>)</a:t>
             </a:r>
           </a:p>
           <a:p>
-            <a:endParaRPr lang="en-US" sz="1400" dirty="0"/>
-          </a:p>
-          <a:p>
-            <a:r>
-              <a:rPr lang="en-US" sz="1400" dirty="0"/>
+            <a:endParaRPr lang="en-US" sz="1200" dirty="0"/>
+          </a:p>
+          <a:p>
+            <a:r>
+              <a:rPr lang="en-US" sz="1200" dirty="0"/>
               <a:t>Deviance Residuals: </a:t>
             </a:r>
           </a:p>
           <a:p>
             <a:r>
-              <a:rPr lang="en-US" sz="1400" dirty="0"/>
+              <a:rPr lang="en-US" sz="1200" dirty="0"/>
               <a:t>    Min       1Q   Median       3Q      Max  </a:t>
             </a:r>
           </a:p>
           <a:p>
             <a:r>
-              <a:rPr lang="en-US" sz="1400" dirty="0"/>
-              <a:t>-1.2411  -0.8850  -0.2342   1.1453   3.6835  </a:t>
-            </a:r>
-          </a:p>
-          <a:p>
-            <a:endParaRPr lang="en-US" sz="1400" dirty="0"/>
-          </a:p>
-          <a:p>
-            <a:r>
-              <a:rPr lang="en-US" sz="1400" dirty="0"/>
+              <a:rPr lang="en-US" sz="1200" dirty="0"/>
+              <a:t>-1.4019  -0.6713  -0.1825  -0.0119   4.5829  </a:t>
+            </a:r>
+          </a:p>
+          <a:p>
+            <a:endParaRPr lang="en-US" sz="1200" dirty="0"/>
+          </a:p>
+          <a:p>
+            <a:r>
+              <a:rPr lang="en-US" sz="1200" dirty="0"/>
               <a:t>Coefficients:</a:t>
             </a:r>
           </a:p>
           <a:p>
             <a:r>
-              <a:rPr lang="en-US" sz="1400" dirty="0"/>
-              <a:t>            Estimate Std. Error z value </a:t>
-            </a:r>
-            <a:r>
-              <a:rPr lang="en-US" sz="1400" dirty="0" err="1"/>
+              <a:rPr lang="en-US" sz="1200" dirty="0"/>
+              <a:t>                   Estimate Std. Error z value </a:t>
+            </a:r>
+            <a:r>
+              <a:rPr lang="en-US" sz="1200" dirty="0" err="1"/>
               <a:t>Pr</a:t>
             </a:r>
             <a:r>
-              <a:rPr lang="en-US" sz="1400" dirty="0"/>
+              <a:rPr lang="en-US" sz="1200" dirty="0"/>
               <a:t>(&gt;|z|)    </a:t>
             </a:r>
           </a:p>
           <a:p>
             <a:r>
-              <a:rPr lang="en-US" sz="1400" dirty="0"/>
-              <a:t>(Intercept) -0.03588    0.15745  -0.228    0.820    </a:t>
-            </a:r>
-          </a:p>
-          <a:p>
-            <a:r>
-              <a:rPr lang="en-US" sz="1400" dirty="0"/>
-              <a:t>salinity    -0.54310    0.02613 -20.786   &lt;2e-16 ***</a:t>
-            </a:r>
-          </a:p>
-          <a:p>
-            <a:r>
-              <a:rPr lang="en-US" sz="1400" dirty="0"/>
-              <a:t>month        0.01952    0.02000   0.976    0.329    </a:t>
-            </a:r>
-          </a:p>
-          <a:p>
-            <a:r>
-              <a:rPr lang="en-US" sz="1400" dirty="0"/>
+              <a:rPr lang="en-US" sz="1200" dirty="0"/>
+              <a:t>(Intercept)         0.56076    0.09218   6.083 1.18e-09 ***</a:t>
+            </a:r>
+          </a:p>
+          <a:p>
+            <a:r>
+              <a:rPr lang="en-US" sz="1200" dirty="0"/>
+              <a:t>salinity           -0.76617    0.05143 -14.896  &lt; 2e-16 ***</a:t>
+            </a:r>
+          </a:p>
+          <a:p>
+            <a:r>
+              <a:rPr lang="en-US" sz="1200" dirty="0"/>
+              <a:t>ns(month, </a:t>
+            </a:r>
+            <a:r>
+              <a:rPr lang="en-US" sz="1200" dirty="0" err="1"/>
+              <a:t>df</a:t>
+            </a:r>
+            <a:r>
+              <a:rPr lang="en-US" sz="1200" dirty="0"/>
+              <a:t> = 2)1 -3.06174    0.22810 -13.423  &lt; 2e-16 ***</a:t>
+            </a:r>
+          </a:p>
+          <a:p>
+            <a:r>
+              <a:rPr lang="en-US" sz="1200" dirty="0"/>
+              <a:t>ns(month, </a:t>
+            </a:r>
+            <a:r>
+              <a:rPr lang="en-US" sz="1200" dirty="0" err="1"/>
+              <a:t>df</a:t>
+            </a:r>
+            <a:r>
+              <a:rPr lang="en-US" sz="1200" dirty="0"/>
+              <a:t> = 2)2 -0.22034    0.15315  -1.439     0.15    </a:t>
+            </a:r>
+          </a:p>
+          <a:p>
+            <a:r>
+              <a:rPr lang="en-US" sz="1200" dirty="0"/>
               <a:t>---</a:t>
             </a:r>
           </a:p>
           <a:p>
             <a:r>
-              <a:rPr lang="en-US" sz="1400" dirty="0" err="1"/>
+              <a:rPr lang="en-US" sz="1200" dirty="0" err="1"/>
               <a:t>Signif</a:t>
             </a:r>
             <a:r>
-              <a:rPr lang="en-US" sz="1400" dirty="0"/>
+              <a:rPr lang="en-US" sz="1200" dirty="0"/>
               <a:t>. codes:  0 ‘***’ 0.001 ‘**’ 0.01 ‘*’ 0.05 ‘.’ 0.1 ‘ ’ 1</a:t>
             </a:r>
           </a:p>
           <a:p>
-            <a:endParaRPr lang="en-US" sz="1400" dirty="0"/>
-          </a:p>
-          <a:p>
-            <a:r>
-              <a:rPr lang="en-US" sz="1400" dirty="0"/>
+            <a:endParaRPr lang="en-US" sz="1200" dirty="0"/>
+          </a:p>
+          <a:p>
+            <a:r>
+              <a:rPr lang="en-US" sz="1200" dirty="0"/>
               <a:t>(Dispersion parameter for binomial family taken to be 1)</a:t>
             </a:r>
           </a:p>
           <a:p>
-            <a:endParaRPr lang="en-US" sz="1400" dirty="0"/>
-          </a:p>
-          <a:p>
-            <a:r>
-              <a:rPr lang="en-US" sz="1400" dirty="0"/>
-              <a:t>    Null deviance: 5022.4  on 4248  degrees of freedom</a:t>
-            </a:r>
-          </a:p>
-          <a:p>
-            <a:r>
-              <a:rPr lang="en-US" sz="1400" dirty="0"/>
-              <a:t>Residual deviance: 3877.5  on 4246  degrees of freedom</a:t>
-            </a:r>
-          </a:p>
-          <a:p>
-            <a:r>
-              <a:rPr lang="en-US" sz="1400" dirty="0"/>
-              <a:t>AIC: 3883.5</a:t>
-            </a:r>
-          </a:p>
-          <a:p>
-            <a:endParaRPr lang="en-US" sz="1400" dirty="0"/>
-          </a:p>
-          <a:p>
-            <a:r>
-              <a:rPr lang="en-US" sz="1400" dirty="0"/>
-              <a:t>Number of Fisher Scoring iterations: 6</a:t>
+            <a:endParaRPr lang="en-US" sz="1200" dirty="0"/>
+          </a:p>
+          <a:p>
+            <a:r>
+              <a:rPr lang="en-US" sz="1200" dirty="0"/>
+              <a:t>    Null deviance: 3901.5  on 4248  degrees of freedom</a:t>
+            </a:r>
+          </a:p>
+          <a:p>
+            <a:r>
+              <a:rPr lang="en-US" sz="1200" dirty="0"/>
+              <a:t>Residual deviance: 2820.1  on 4245  degrees of freedom</a:t>
+            </a:r>
+          </a:p>
+          <a:p>
+            <a:r>
+              <a:rPr lang="en-US" sz="1200" dirty="0"/>
+              <a:t>AIC: 2828.1</a:t>
+            </a:r>
+          </a:p>
+          <a:p>
+            <a:endParaRPr lang="en-US" sz="1200" dirty="0"/>
+          </a:p>
+          <a:p>
+            <a:r>
+              <a:rPr lang="en-US" sz="1200" dirty="0"/>
+              <a:t>Number of Fisher Scoring iterations: 8</a:t>
             </a:r>
           </a:p>
         </p:txBody>
@@ -5323,7 +5355,7 @@
           <a:p>
             <a:r>
               <a:rPr lang="en-US" sz="2800" dirty="0"/>
-              <a:t>Example: B. longirostris</a:t>
+              <a:t>Example: Daphnia</a:t>
             </a:r>
           </a:p>
         </p:txBody>
@@ -5342,8 +5374,8 @@
         </p:nvSpPr>
         <p:spPr>
           <a:xfrm>
-            <a:off x="5440351" y="1217007"/>
-            <a:ext cx="6203446" cy="4832092"/>
+            <a:off x="5440350" y="1217007"/>
+            <a:ext cx="6751649" cy="4339650"/>
           </a:xfrm>
           <a:prstGeom prst="rect">
             <a:avLst/>
@@ -5357,163 +5389,265 @@
           <a:lstStyle/>
           <a:p>
             <a:r>
-              <a:rPr lang="en-US" sz="1400" b="1" dirty="0"/>
+              <a:rPr lang="en-US" sz="1200" b="1" dirty="0"/>
               <a:t>Presence only</a:t>
             </a:r>
           </a:p>
           <a:p>
             <a:r>
-              <a:rPr lang="en-US" sz="1400" dirty="0"/>
-              <a:t>Family: Negative Binomial(0.367) </a:t>
-            </a:r>
-          </a:p>
-          <a:p>
-            <a:r>
-              <a:rPr lang="en-US" sz="1400" dirty="0"/>
+              <a:rPr lang="en-US" sz="1200" dirty="0"/>
+              <a:t>m4.2&lt;-gam(BPUE~s(salinity)+s(</a:t>
+            </a:r>
+            <a:r>
+              <a:rPr lang="en-US" sz="1200" dirty="0" err="1"/>
+              <a:t>month,k</a:t>
+            </a:r>
+            <a:r>
+              <a:rPr lang="en-US" sz="1200" dirty="0"/>
+              <a:t>=5),random = list(Station = ~1), </a:t>
+            </a:r>
+            <a:r>
+              <a:rPr lang="en-US" sz="1200" dirty="0" err="1"/>
+              <a:t>niterPQL</a:t>
+            </a:r>
+            <a:r>
+              <a:rPr lang="en-US" sz="1200" dirty="0"/>
+              <a:t>=40,family='</a:t>
+            </a:r>
+            <a:r>
+              <a:rPr lang="en-US" sz="1200" dirty="0" err="1"/>
+              <a:t>nb</a:t>
+            </a:r>
+            <a:r>
+              <a:rPr lang="en-US" sz="1200" dirty="0"/>
+              <a:t>',data=</a:t>
+            </a:r>
+            <a:r>
+              <a:rPr lang="en-US" sz="1200" dirty="0" err="1"/>
+              <a:t>d_p</a:t>
+            </a:r>
+            <a:r>
+              <a:rPr lang="en-US" sz="1200" dirty="0"/>
+              <a:t>)</a:t>
+            </a:r>
+          </a:p>
+          <a:p>
+            <a:r>
+              <a:rPr lang="en-US" sz="1200" dirty="0"/>
+              <a:t>Family: Negative Binomial(0.428) </a:t>
+            </a:r>
+          </a:p>
+          <a:p>
+            <a:r>
+              <a:rPr lang="en-US" sz="1200" dirty="0"/>
               <a:t>Link function: log </a:t>
             </a:r>
           </a:p>
           <a:p>
-            <a:endParaRPr lang="en-US" sz="1400" dirty="0"/>
-          </a:p>
-          <a:p>
-            <a:r>
-              <a:rPr lang="en-US" sz="1400" dirty="0"/>
+            <a:endParaRPr lang="en-US" sz="1200" dirty="0"/>
+          </a:p>
+          <a:p>
+            <a:r>
+              <a:rPr lang="en-US" sz="1200" dirty="0"/>
               <a:t>Formula:</a:t>
             </a:r>
           </a:p>
           <a:p>
             <a:r>
-              <a:rPr lang="en-US" sz="1400" dirty="0"/>
+              <a:rPr lang="en-US" sz="1200" dirty="0"/>
               <a:t>BPUE ~ s(salinity) + s(month, k = 5)</a:t>
             </a:r>
           </a:p>
           <a:p>
-            <a:endParaRPr lang="en-US" sz="1400" dirty="0"/>
-          </a:p>
-          <a:p>
-            <a:r>
-              <a:rPr lang="en-US" sz="1400" dirty="0"/>
+            <a:endParaRPr lang="en-US" sz="1200" dirty="0"/>
+          </a:p>
+          <a:p>
+            <a:r>
+              <a:rPr lang="en-US" sz="1200" dirty="0"/>
               <a:t>Parametric coefficients:</a:t>
             </a:r>
           </a:p>
           <a:p>
             <a:r>
-              <a:rPr lang="en-US" sz="1400" dirty="0"/>
+              <a:rPr lang="en-US" sz="1200" dirty="0"/>
               <a:t>            Estimate Std. Error z value </a:t>
             </a:r>
             <a:r>
-              <a:rPr lang="en-US" sz="1400" dirty="0" err="1"/>
+              <a:rPr lang="en-US" sz="1200" dirty="0" err="1"/>
               <a:t>Pr</a:t>
             </a:r>
             <a:r>
-              <a:rPr lang="en-US" sz="1400" dirty="0"/>
+              <a:rPr lang="en-US" sz="1200" dirty="0"/>
               <a:t>(&gt;|z|)    </a:t>
             </a:r>
           </a:p>
           <a:p>
             <a:r>
-              <a:rPr lang="en-US" sz="1400" dirty="0"/>
-              <a:t>(Intercept)  5.26800    0.04823   109.2   &lt;2e-16 ***</a:t>
-            </a:r>
-          </a:p>
-          <a:p>
-            <a:r>
-              <a:rPr lang="en-US" sz="1400" dirty="0"/>
+              <a:rPr lang="en-US" sz="1200" dirty="0"/>
+              <a:t>(Intercept)  6.62377    0.05658   117.1   &lt;2e-16 ***</a:t>
+            </a:r>
+          </a:p>
+          <a:p>
+            <a:r>
+              <a:rPr lang="en-US" sz="1200" dirty="0"/>
               <a:t>---</a:t>
             </a:r>
           </a:p>
           <a:p>
             <a:r>
-              <a:rPr lang="en-US" sz="1400" dirty="0" err="1"/>
+              <a:rPr lang="en-US" sz="1200" dirty="0" err="1"/>
               <a:t>Signif</a:t>
             </a:r>
             <a:r>
-              <a:rPr lang="en-US" sz="1400" dirty="0"/>
+              <a:rPr lang="en-US" sz="1200" dirty="0"/>
               <a:t>. codes:  0 ‘***’ 0.001 ‘**’ 0.01 ‘*’ 0.05 ‘.’ 0.1 ‘ ’ 1</a:t>
             </a:r>
           </a:p>
           <a:p>
-            <a:endParaRPr lang="en-US" sz="1400" dirty="0"/>
-          </a:p>
-          <a:p>
-            <a:r>
-              <a:rPr lang="en-US" sz="1400" dirty="0"/>
+            <a:endParaRPr lang="en-US" sz="1200" dirty="0"/>
+          </a:p>
+          <a:p>
+            <a:r>
+              <a:rPr lang="en-US" sz="1200" dirty="0"/>
               <a:t>Approximate significance of smooth terms:</a:t>
             </a:r>
           </a:p>
           <a:p>
             <a:r>
-              <a:rPr lang="en-US" sz="1400" dirty="0"/>
+              <a:rPr lang="en-US" sz="1200" dirty="0"/>
               <a:t>              </a:t>
             </a:r>
             <a:r>
-              <a:rPr lang="en-US" sz="1400" dirty="0" err="1"/>
+              <a:rPr lang="en-US" sz="1200" dirty="0" err="1"/>
               <a:t>edf</a:t>
             </a:r>
             <a:r>
-              <a:rPr lang="en-US" sz="1400" dirty="0"/>
+              <a:rPr lang="en-US" sz="1200" dirty="0"/>
               <a:t> </a:t>
             </a:r>
             <a:r>
-              <a:rPr lang="en-US" sz="1400" dirty="0" err="1"/>
+              <a:rPr lang="en-US" sz="1200" dirty="0" err="1"/>
               <a:t>Ref.df</a:t>
             </a:r>
             <a:r>
-              <a:rPr lang="en-US" sz="1400" dirty="0"/>
+              <a:rPr lang="en-US" sz="1200" dirty="0"/>
               <a:t> </a:t>
             </a:r>
             <a:r>
-              <a:rPr lang="en-US" sz="1400" dirty="0" err="1"/>
+              <a:rPr lang="en-US" sz="1200" dirty="0" err="1"/>
               <a:t>Chi.sq</a:t>
             </a:r>
             <a:r>
-              <a:rPr lang="en-US" sz="1400" dirty="0"/>
+              <a:rPr lang="en-US" sz="1200" dirty="0"/>
               <a:t> p-value    </a:t>
             </a:r>
           </a:p>
           <a:p>
             <a:r>
-              <a:rPr lang="en-US" sz="1400" dirty="0"/>
-              <a:t>s(salinity) 8.806  8.989 644.58  &lt;2e-16 ***</a:t>
-            </a:r>
-          </a:p>
-          <a:p>
-            <a:r>
-              <a:rPr lang="en-US" sz="1400" dirty="0"/>
-              <a:t>s(month)    1.008  1.017  79.18  &lt;2e-16 ***</a:t>
-            </a:r>
-          </a:p>
-          <a:p>
-            <a:r>
-              <a:rPr lang="en-US" sz="1400" dirty="0"/>
+              <a:rPr lang="en-US" sz="1200" dirty="0"/>
+              <a:t>s(salinity) 8.885  8.996  533.4  &lt;2e-16 ***</a:t>
+            </a:r>
+          </a:p>
+          <a:p>
+            <a:r>
+              <a:rPr lang="en-US" sz="1200" dirty="0"/>
+              <a:t>s(month)    3.724  3.953  231.0  &lt;2e-16 ***</a:t>
+            </a:r>
+          </a:p>
+          <a:p>
+            <a:r>
+              <a:rPr lang="en-US" sz="1200" dirty="0"/>
               <a:t>---</a:t>
             </a:r>
           </a:p>
           <a:p>
             <a:r>
-              <a:rPr lang="en-US" sz="1400" dirty="0" err="1"/>
+              <a:rPr lang="en-US" sz="1200" dirty="0" err="1"/>
               <a:t>Signif</a:t>
             </a:r>
             <a:r>
-              <a:rPr lang="en-US" sz="1400" dirty="0"/>
+              <a:rPr lang="en-US" sz="1200" dirty="0"/>
               <a:t>. codes:  0 ‘***’ 0.001 ‘**’ 0.01 ‘*’ 0.05 ‘.’ 0.1 ‘ ’ 1</a:t>
             </a:r>
           </a:p>
           <a:p>
-            <a:endParaRPr lang="en-US" sz="1400" dirty="0"/>
-          </a:p>
-          <a:p>
-            <a:r>
-              <a:rPr lang="en-US" sz="1400" dirty="0"/>
-              <a:t>R-sq.(adj) =  0.0179   Deviance explained = 22.2%</a:t>
-            </a:r>
-          </a:p>
-          <a:p>
-            <a:r>
-              <a:rPr lang="en-US" sz="1400" dirty="0"/>
-              <a:t>-REML = 6868.5  Scale est. = 1         n = 1181</a:t>
-            </a:r>
+            <a:endParaRPr lang="en-US" sz="1200" dirty="0"/>
+          </a:p>
+          <a:p>
+            <a:r>
+              <a:rPr lang="en-US" sz="1200" dirty="0"/>
+              <a:t>R-sq.(adj) =  0.062   Deviance explained = 34.6%</a:t>
+            </a:r>
+          </a:p>
+          <a:p>
+            <a:r>
+              <a:rPr lang="en-US" sz="1200" dirty="0"/>
+              <a:t>-REML = 5368.5  Scale est. = 1         n = 731</a:t>
+            </a:r>
+          </a:p>
+        </p:txBody>
+      </p:sp>
+      <p:sp>
+        <p:nvSpPr>
+          <p:cNvPr id="8" name="TextBox 7">
+            <a:extLst>
+              <a:ext uri="{FF2B5EF4-FFF2-40B4-BE49-F238E27FC236}">
+                <a16:creationId xmlns:a16="http://schemas.microsoft.com/office/drawing/2014/main" id="{10C28378-2EE2-0813-B3A7-7C3F8A59C24C}"/>
+              </a:ext>
+            </a:extLst>
+          </p:cNvPr>
+          <p:cNvSpPr txBox="1"/>
+          <p:nvPr/>
+        </p:nvSpPr>
+        <p:spPr>
+          <a:xfrm>
+            <a:off x="142592" y="5970628"/>
+            <a:ext cx="6206150" cy="923330"/>
+          </a:xfrm>
+          <a:prstGeom prst="rect">
+            <a:avLst/>
+          </a:prstGeom>
+          <a:noFill/>
+        </p:spPr>
+        <p:txBody>
+          <a:bodyPr wrap="square">
+            <a:spAutoFit/>
+          </a:bodyPr>
+          <a:lstStyle/>
+          <a:p>
+            <a:r>
+              <a:rPr lang="en-US" sz="1800" dirty="0"/>
+              <a:t>Notes:</a:t>
+            </a:r>
+          </a:p>
+          <a:p>
+            <a:pPr marL="285750" indent="-285750">
+              <a:buFont typeface="Arial" panose="020B0604020202020204" pitchFamily="34" charset="0"/>
+              <a:buChar char="•"/>
+            </a:pPr>
+            <a:r>
+              <a:rPr lang="en-US" sz="1800" dirty="0"/>
+              <a:t>currently filtered for just May – Nov</a:t>
+            </a:r>
+          </a:p>
+          <a:p>
+            <a:pPr marL="285750" indent="-285750">
+              <a:buFont typeface="Arial" panose="020B0604020202020204" pitchFamily="34" charset="0"/>
+              <a:buChar char="•"/>
+            </a:pPr>
+            <a:r>
+              <a:rPr lang="en-US" dirty="0"/>
+              <a:t>For </a:t>
+            </a:r>
+            <a:r>
+              <a:rPr lang="en-US" dirty="0" err="1"/>
+              <a:t>glm</a:t>
+            </a:r>
+            <a:r>
+              <a:rPr lang="en-US" dirty="0"/>
+              <a:t>, when </a:t>
+            </a:r>
+            <a:endParaRPr lang="en-US" sz="1800" dirty="0"/>
           </a:p>
         </p:txBody>
       </p:sp>
@@ -5631,7 +5765,7 @@
           <a:p>
             <a:r>
               <a:rPr lang="en-US" sz="2800" dirty="0"/>
-              <a:t>Example: B. longirostris</a:t>
+              <a:t>Example: Daphnia</a:t>
             </a:r>
           </a:p>
         </p:txBody>
@@ -5658,9 +5792,8 @@
               </a:ext>
             </a:extLst>
           </a:blip>
-          <a:stretch>
-            <a:fillRect/>
-          </a:stretch>
+          <a:srcRect/>
+          <a:stretch/>
         </p:blipFill>
         <p:spPr>
           <a:xfrm>
@@ -5674,7 +5807,7 @@
       </p:pic>
       <p:pic>
         <p:nvPicPr>
-          <p:cNvPr id="8" name="Picture 7" descr="Chart&#10;&#10;Description automatically generated">
+          <p:cNvPr id="8" name="Picture 7">
             <a:extLst>
               <a:ext uri="{FF2B5EF4-FFF2-40B4-BE49-F238E27FC236}">
                 <a16:creationId xmlns:a16="http://schemas.microsoft.com/office/drawing/2014/main" id="{C9725897-78CC-8EB4-FD28-35528E1614D0}"/>
@@ -5694,9 +5827,8 @@
               </a:ext>
             </a:extLst>
           </a:blip>
-          <a:stretch>
-            <a:fillRect/>
-          </a:stretch>
+          <a:srcRect/>
+          <a:stretch/>
         </p:blipFill>
         <p:spPr>
           <a:xfrm>
@@ -5846,257 +5978,430 @@
           <a:chExt cx="0" cy="0"/>
         </a:xfrm>
       </p:grpSpPr>
-      <p:pic>
-        <p:nvPicPr>
-          <p:cNvPr id="5" name="Picture 4" descr="Chart, box and whisker chart&#10;&#10;Description automatically generated">
-            <a:extLst>
-              <a:ext uri="{FF2B5EF4-FFF2-40B4-BE49-F238E27FC236}">
-                <a16:creationId xmlns:a16="http://schemas.microsoft.com/office/drawing/2014/main" id="{6FD94798-2235-68DA-E129-A9242FE3A7C6}"/>
-              </a:ext>
-            </a:extLst>
-          </p:cNvPr>
-          <p:cNvPicPr>
-            <a:picLocks noChangeAspect="1"/>
-          </p:cNvPicPr>
-          <p:nvPr/>
-        </p:nvPicPr>
-        <p:blipFill>
-          <a:blip r:embed="rId2">
-            <a:extLst>
-              <a:ext uri="{28A0092B-C50C-407E-A947-70E740481C1C}">
-                <a14:useLocalDpi xmlns:a14="http://schemas.microsoft.com/office/drawing/2010/main" val="0"/>
-              </a:ext>
-            </a:extLst>
-          </a:blip>
-          <a:stretch>
-            <a:fillRect/>
-          </a:stretch>
-        </p:blipFill>
-        <p:spPr>
-          <a:xfrm>
-            <a:off x="98475" y="76147"/>
-            <a:ext cx="5029277" cy="3352851"/>
-          </a:xfrm>
-          <a:prstGeom prst="rect">
-            <a:avLst/>
-          </a:prstGeom>
-          <a:ln>
-            <a:solidFill>
-              <a:schemeClr val="tx1"/>
-            </a:solidFill>
-          </a:ln>
-        </p:spPr>
-      </p:pic>
-      <p:pic>
-        <p:nvPicPr>
-          <p:cNvPr id="9" name="Picture 8">
-            <a:extLst>
-              <a:ext uri="{FF2B5EF4-FFF2-40B4-BE49-F238E27FC236}">
-                <a16:creationId xmlns:a16="http://schemas.microsoft.com/office/drawing/2014/main" id="{F6B60D4E-DA31-C0DD-FDE6-81F66DFA2C05}"/>
-              </a:ext>
-            </a:extLst>
-          </p:cNvPr>
-          <p:cNvPicPr>
-            <a:picLocks noChangeAspect="1"/>
-          </p:cNvPicPr>
-          <p:nvPr/>
-        </p:nvPicPr>
-        <p:blipFill>
-          <a:blip r:embed="rId3">
-            <a:extLst>
-              <a:ext uri="{28A0092B-C50C-407E-A947-70E740481C1C}">
-                <a14:useLocalDpi xmlns:a14="http://schemas.microsoft.com/office/drawing/2010/main" val="0"/>
-              </a:ext>
-            </a:extLst>
-          </a:blip>
-          <a:stretch>
-            <a:fillRect/>
-          </a:stretch>
-        </p:blipFill>
-        <p:spPr>
-          <a:xfrm>
-            <a:off x="5221346" y="0"/>
-            <a:ext cx="3429000" cy="3429000"/>
-          </a:xfrm>
-          <a:prstGeom prst="rect">
-            <a:avLst/>
-          </a:prstGeom>
-        </p:spPr>
-      </p:pic>
-      <p:pic>
-        <p:nvPicPr>
-          <p:cNvPr id="11" name="Picture 10" descr="Chart, box and whisker chart&#10;&#10;Description automatically generated">
-            <a:extLst>
-              <a:ext uri="{FF2B5EF4-FFF2-40B4-BE49-F238E27FC236}">
-                <a16:creationId xmlns:a16="http://schemas.microsoft.com/office/drawing/2014/main" id="{CE640AF2-FDA7-7D89-D2CD-7D5F32369E11}"/>
-              </a:ext>
-            </a:extLst>
-          </p:cNvPr>
-          <p:cNvPicPr>
-            <a:picLocks noChangeAspect="1"/>
-          </p:cNvPicPr>
-          <p:nvPr/>
-        </p:nvPicPr>
-        <p:blipFill>
-          <a:blip r:embed="rId4">
-            <a:extLst>
-              <a:ext uri="{28A0092B-C50C-407E-A947-70E740481C1C}">
-                <a14:useLocalDpi xmlns:a14="http://schemas.microsoft.com/office/drawing/2010/main" val="0"/>
-              </a:ext>
-            </a:extLst>
-          </a:blip>
-          <a:stretch>
-            <a:fillRect/>
-          </a:stretch>
-        </p:blipFill>
-        <p:spPr>
-          <a:xfrm>
-            <a:off x="8763000" y="0"/>
-            <a:ext cx="3429000" cy="3429000"/>
-          </a:xfrm>
-          <a:prstGeom prst="rect">
-            <a:avLst/>
-          </a:prstGeom>
-        </p:spPr>
-      </p:pic>
-      <p:pic>
-        <p:nvPicPr>
-          <p:cNvPr id="14" name="Picture 13" descr="Chart, box and whisker chart&#10;&#10;Description automatically generated">
-            <a:extLst>
-              <a:ext uri="{FF2B5EF4-FFF2-40B4-BE49-F238E27FC236}">
-                <a16:creationId xmlns:a16="http://schemas.microsoft.com/office/drawing/2014/main" id="{C32ED9E6-D291-2EE3-C90D-3F8AB938467A}"/>
-              </a:ext>
-            </a:extLst>
-          </p:cNvPr>
-          <p:cNvPicPr>
-            <a:picLocks noChangeAspect="1"/>
-          </p:cNvPicPr>
-          <p:nvPr/>
-        </p:nvPicPr>
-        <p:blipFill>
-          <a:blip r:embed="rId5">
-            <a:extLst>
-              <a:ext uri="{28A0092B-C50C-407E-A947-70E740481C1C}">
-                <a14:useLocalDpi xmlns:a14="http://schemas.microsoft.com/office/drawing/2010/main" val="0"/>
-              </a:ext>
-            </a:extLst>
-          </a:blip>
-          <a:stretch>
-            <a:fillRect/>
-          </a:stretch>
-        </p:blipFill>
-        <p:spPr>
-          <a:xfrm>
-            <a:off x="5221346" y="3428999"/>
-            <a:ext cx="3429001" cy="3429001"/>
-          </a:xfrm>
-          <a:prstGeom prst="rect">
-            <a:avLst/>
-          </a:prstGeom>
-        </p:spPr>
-      </p:pic>
-      <p:pic>
-        <p:nvPicPr>
-          <p:cNvPr id="18" name="Picture 17" descr="Chart&#10;&#10;Description automatically generated">
-            <a:extLst>
-              <a:ext uri="{FF2B5EF4-FFF2-40B4-BE49-F238E27FC236}">
-                <a16:creationId xmlns:a16="http://schemas.microsoft.com/office/drawing/2014/main" id="{D1AE3916-4792-67CE-6EF4-4E30E6EF82BD}"/>
-              </a:ext>
-            </a:extLst>
-          </p:cNvPr>
-          <p:cNvPicPr>
-            <a:picLocks noChangeAspect="1"/>
-          </p:cNvPicPr>
-          <p:nvPr/>
-        </p:nvPicPr>
-        <p:blipFill>
-          <a:blip r:embed="rId6">
-            <a:extLst>
-              <a:ext uri="{28A0092B-C50C-407E-A947-70E740481C1C}">
-                <a14:useLocalDpi xmlns:a14="http://schemas.microsoft.com/office/drawing/2010/main" val="0"/>
-              </a:ext>
-            </a:extLst>
-          </a:blip>
-          <a:stretch>
-            <a:fillRect/>
-          </a:stretch>
-        </p:blipFill>
-        <p:spPr>
-          <a:xfrm>
-            <a:off x="8762998" y="3428998"/>
-            <a:ext cx="3429002" cy="3429002"/>
-          </a:xfrm>
-          <a:prstGeom prst="rect">
-            <a:avLst/>
-          </a:prstGeom>
-        </p:spPr>
-      </p:pic>
-      <p:sp>
-        <p:nvSpPr>
-          <p:cNvPr id="36" name="Rectangle 35">
-            <a:extLst>
-              <a:ext uri="{FF2B5EF4-FFF2-40B4-BE49-F238E27FC236}">
-                <a16:creationId xmlns:a16="http://schemas.microsoft.com/office/drawing/2014/main" id="{470BE9EB-0BE0-8E85-F236-34BA746076C6}"/>
-              </a:ext>
-            </a:extLst>
-          </p:cNvPr>
-          <p:cNvSpPr/>
-          <p:nvPr/>
-        </p:nvSpPr>
-        <p:spPr>
-          <a:xfrm>
-            <a:off x="7778022" y="3264156"/>
-            <a:ext cx="389850" cy="584775"/>
-          </a:xfrm>
-          <a:prstGeom prst="rect">
-            <a:avLst/>
-          </a:prstGeom>
-          <a:noFill/>
-        </p:spPr>
-        <p:txBody>
-          <a:bodyPr wrap="none" lIns="91440" tIns="45720" rIns="91440" bIns="45720">
-            <a:spAutoFit/>
-          </a:bodyPr>
-          <a:lstStyle/>
-          <a:p>
-            <a:pPr algn="ctr"/>
-            <a:r>
-              <a:rPr lang="en-US" sz="3200" b="0" i="0" u="none" strike="noStrike" cap="none" spc="0" dirty="0">
-                <a:ln w="0"/>
-                <a:solidFill>
-                  <a:schemeClr val="tx1"/>
-                </a:solidFill>
-                <a:effectLst>
-                  <a:outerShdw blurRad="38100" dist="19050" dir="2700000" algn="tl" rotWithShape="0">
-                    <a:schemeClr val="dk1">
-                      <a:alpha val="40000"/>
-                    </a:schemeClr>
-                  </a:outerShdw>
-                </a:effectLst>
-                <a:latin typeface="Calibri" panose="020F0502020204030204" pitchFamily="34" charset="0"/>
-              </a:rPr>
-              <a:t>*</a:t>
-            </a:r>
-            <a:endParaRPr lang="en-US" sz="3200" b="0" cap="none" spc="0" dirty="0">
-              <a:ln w="0"/>
-              <a:solidFill>
-                <a:schemeClr val="tx1"/>
-              </a:solidFill>
-              <a:effectLst>
-                <a:outerShdw blurRad="38100" dist="19050" dir="2700000" algn="tl" rotWithShape="0">
-                  <a:schemeClr val="dk1">
-                    <a:alpha val="40000"/>
-                  </a:schemeClr>
-                </a:outerShdw>
-              </a:effectLst>
-            </a:endParaRPr>
-          </a:p>
-        </p:txBody>
-      </p:sp>
+      <p:graphicFrame>
+        <p:nvGraphicFramePr>
+          <p:cNvPr id="4" name="Table 4">
+            <a:extLst>
+              <a:ext uri="{FF2B5EF4-FFF2-40B4-BE49-F238E27FC236}">
+                <a16:creationId xmlns:a16="http://schemas.microsoft.com/office/drawing/2014/main" id="{B9B4BDA2-BB41-3CE4-9A48-80337242D4E8}"/>
+              </a:ext>
+            </a:extLst>
+          </p:cNvPr>
+          <p:cNvGraphicFramePr>
+            <a:graphicFrameLocks noGrp="1"/>
+          </p:cNvGraphicFramePr>
+          <p:nvPr>
+            <p:extLst>
+              <p:ext uri="{D42A27DB-BD31-4B8C-83A1-F6EECF244321}">
+                <p14:modId xmlns:p14="http://schemas.microsoft.com/office/powerpoint/2010/main" val="1811759239"/>
+              </p:ext>
+            </p:extLst>
+          </p:nvPr>
+        </p:nvGraphicFramePr>
+        <p:xfrm>
+          <a:off x="2032000" y="719666"/>
+          <a:ext cx="8127999" cy="2123440"/>
+        </p:xfrm>
+        <a:graphic>
+          <a:graphicData uri="http://schemas.openxmlformats.org/drawingml/2006/table">
+            <a:tbl>
+              <a:tblPr firstRow="1" bandRow="1">
+                <a:tableStyleId>{5C22544A-7EE6-4342-B048-85BDC9FD1C3A}</a:tableStyleId>
+              </a:tblPr>
+              <a:tblGrid>
+                <a:gridCol w="2709333">
+                  <a:extLst>
+                    <a:ext uri="{9D8B030D-6E8A-4147-A177-3AD203B41FA5}">
+                      <a16:colId xmlns:a16="http://schemas.microsoft.com/office/drawing/2014/main" val="3921652629"/>
+                    </a:ext>
+                  </a:extLst>
+                </a:gridCol>
+                <a:gridCol w="2709333">
+                  <a:extLst>
+                    <a:ext uri="{9D8B030D-6E8A-4147-A177-3AD203B41FA5}">
+                      <a16:colId xmlns:a16="http://schemas.microsoft.com/office/drawing/2014/main" val="1049487853"/>
+                    </a:ext>
+                  </a:extLst>
+                </a:gridCol>
+                <a:gridCol w="2709333">
+                  <a:extLst>
+                    <a:ext uri="{9D8B030D-6E8A-4147-A177-3AD203B41FA5}">
+                      <a16:colId xmlns:a16="http://schemas.microsoft.com/office/drawing/2014/main" val="1544519040"/>
+                    </a:ext>
+                  </a:extLst>
+                </a:gridCol>
+              </a:tblGrid>
+              <a:tr h="370840">
+                <a:tc>
+                  <a:txBody>
+                    <a:bodyPr/>
+                    <a:lstStyle/>
+                    <a:p>
+                      <a:r>
+                        <a:rPr lang="en-US" dirty="0"/>
+                        <a:t>Taxa</a:t>
+                      </a:r>
+                    </a:p>
+                  </a:txBody>
+                  <a:tcPr/>
+                </a:tc>
+                <a:tc>
+                  <a:txBody>
+                    <a:bodyPr/>
+                    <a:lstStyle/>
+                    <a:p>
+                      <a:r>
+                        <a:rPr lang="en-US" dirty="0"/>
+                        <a:t>Binomial Presence Absence</a:t>
+                      </a:r>
+                    </a:p>
+                  </a:txBody>
+                  <a:tcPr/>
+                </a:tc>
+                <a:tc>
+                  <a:txBody>
+                    <a:bodyPr/>
+                    <a:lstStyle/>
+                    <a:p>
+                      <a:r>
+                        <a:rPr lang="en-US" dirty="0"/>
+                        <a:t>Presence negative binomial</a:t>
+                      </a:r>
+                    </a:p>
+                  </a:txBody>
+                  <a:tcPr/>
+                </a:tc>
+                <a:extLst>
+                  <a:ext uri="{0D108BD9-81ED-4DB2-BD59-A6C34878D82A}">
+                    <a16:rowId xmlns:a16="http://schemas.microsoft.com/office/drawing/2014/main" val="3181870294"/>
+                  </a:ext>
+                </a:extLst>
+              </a:tr>
+              <a:tr h="370840">
+                <a:tc>
+                  <a:txBody>
+                    <a:bodyPr/>
+                    <a:lstStyle/>
+                    <a:p>
+                      <a:r>
+                        <a:rPr lang="en-US" dirty="0"/>
+                        <a:t>Daphnia</a:t>
+                      </a:r>
+                    </a:p>
+                  </a:txBody>
+                  <a:tcPr/>
+                </a:tc>
+                <a:tc>
+                  <a:txBody>
+                    <a:bodyPr/>
+                    <a:lstStyle/>
+                    <a:p>
+                      <a:r>
+                        <a:rPr lang="en-US" b="1" dirty="0"/>
+                        <a:t>salinity</a:t>
+                      </a:r>
+                      <a:r>
+                        <a:rPr lang="en-US" dirty="0"/>
+                        <a:t>, </a:t>
+                      </a:r>
+                      <a:r>
+                        <a:rPr lang="en-US" b="1" dirty="0"/>
+                        <a:t>month</a:t>
+                      </a:r>
+                      <a:endParaRPr lang="en-US" dirty="0"/>
+                    </a:p>
+                  </a:txBody>
+                  <a:tcPr/>
+                </a:tc>
+                <a:tc>
+                  <a:txBody>
+                    <a:bodyPr/>
+                    <a:lstStyle/>
+                    <a:p>
+                      <a:r>
+                        <a:rPr lang="en-US" b="1" dirty="0"/>
+                        <a:t>salinity, month</a:t>
+                      </a:r>
+                    </a:p>
+                  </a:txBody>
+                  <a:tcPr/>
+                </a:tc>
+                <a:extLst>
+                  <a:ext uri="{0D108BD9-81ED-4DB2-BD59-A6C34878D82A}">
+                    <a16:rowId xmlns:a16="http://schemas.microsoft.com/office/drawing/2014/main" val="1702359678"/>
+                  </a:ext>
+                </a:extLst>
+              </a:tr>
+              <a:tr h="370840">
+                <a:tc>
+                  <a:txBody>
+                    <a:bodyPr/>
+                    <a:lstStyle/>
+                    <a:p>
+                      <a:r>
+                        <a:rPr lang="en-US" dirty="0"/>
+                        <a:t>H. longirostris</a:t>
+                      </a:r>
+                    </a:p>
+                  </a:txBody>
+                  <a:tcPr/>
+                </a:tc>
+                <a:tc>
+                  <a:txBody>
+                    <a:bodyPr/>
+                    <a:lstStyle/>
+                    <a:p>
+                      <a:pPr marL="0" marR="0" lvl="0" indent="0" algn="l" defTabSz="914400" rtl="0" eaLnBrk="1" fontAlgn="auto" latinLnBrk="0" hangingPunct="1">
+                        <a:lnSpc>
+                          <a:spcPct val="100000"/>
+                        </a:lnSpc>
+                        <a:spcBef>
+                          <a:spcPts val="0"/>
+                        </a:spcBef>
+                        <a:spcAft>
+                          <a:spcPts val="0"/>
+                        </a:spcAft>
+                        <a:buClrTx/>
+                        <a:buSzTx/>
+                        <a:buFontTx/>
+                        <a:buNone/>
+                        <a:tabLst/>
+                        <a:defRPr/>
+                      </a:pPr>
+                      <a:r>
+                        <a:rPr lang="en-US" dirty="0"/>
+                        <a:t>salinity, </a:t>
+                      </a:r>
+                      <a:r>
+                        <a:rPr lang="en-US" b="1" dirty="0"/>
+                        <a:t>month</a:t>
+                      </a:r>
+                    </a:p>
+                  </a:txBody>
+                  <a:tcPr/>
+                </a:tc>
+                <a:tc>
+                  <a:txBody>
+                    <a:bodyPr/>
+                    <a:lstStyle/>
+                    <a:p>
+                      <a:pPr marL="0" marR="0" lvl="0" indent="0" algn="l" defTabSz="914400" rtl="0" eaLnBrk="1" fontAlgn="auto" latinLnBrk="0" hangingPunct="1">
+                        <a:lnSpc>
+                          <a:spcPct val="100000"/>
+                        </a:lnSpc>
+                        <a:spcBef>
+                          <a:spcPts val="0"/>
+                        </a:spcBef>
+                        <a:spcAft>
+                          <a:spcPts val="0"/>
+                        </a:spcAft>
+                        <a:buClrTx/>
+                        <a:buSzTx/>
+                        <a:buFontTx/>
+                        <a:buNone/>
+                        <a:tabLst/>
+                        <a:defRPr/>
+                      </a:pPr>
+                      <a:r>
+                        <a:rPr lang="en-US" b="1" dirty="0"/>
+                        <a:t>Salinity, month</a:t>
+                      </a:r>
+                    </a:p>
+                  </a:txBody>
+                  <a:tcPr/>
+                </a:tc>
+                <a:extLst>
+                  <a:ext uri="{0D108BD9-81ED-4DB2-BD59-A6C34878D82A}">
+                    <a16:rowId xmlns:a16="http://schemas.microsoft.com/office/drawing/2014/main" val="2447931265"/>
+                  </a:ext>
+                </a:extLst>
+              </a:tr>
+              <a:tr h="370840">
+                <a:tc>
+                  <a:txBody>
+                    <a:bodyPr/>
+                    <a:lstStyle/>
+                    <a:p>
+                      <a:r>
+                        <a:rPr lang="en-US" dirty="0"/>
+                        <a:t>L. tetraspina</a:t>
+                      </a:r>
+                    </a:p>
+                  </a:txBody>
+                  <a:tcPr/>
+                </a:tc>
+                <a:tc>
+                  <a:txBody>
+                    <a:bodyPr/>
+                    <a:lstStyle/>
+                    <a:p>
+                      <a:pPr marL="0" marR="0" lvl="0" indent="0" algn="l" defTabSz="914400" rtl="0" eaLnBrk="1" fontAlgn="auto" latinLnBrk="0" hangingPunct="1">
+                        <a:lnSpc>
+                          <a:spcPct val="100000"/>
+                        </a:lnSpc>
+                        <a:spcBef>
+                          <a:spcPts val="0"/>
+                        </a:spcBef>
+                        <a:spcAft>
+                          <a:spcPts val="0"/>
+                        </a:spcAft>
+                        <a:buClrTx/>
+                        <a:buSzTx/>
+                        <a:buFontTx/>
+                        <a:buNone/>
+                        <a:tabLst/>
+                        <a:defRPr/>
+                      </a:pPr>
+                      <a:r>
+                        <a:rPr lang="en-US" b="1" dirty="0"/>
+                        <a:t>salinity</a:t>
+                      </a:r>
+                      <a:r>
+                        <a:rPr lang="en-US" dirty="0"/>
+                        <a:t>, </a:t>
+                      </a:r>
+                      <a:r>
+                        <a:rPr lang="en-US" b="1" dirty="0"/>
+                        <a:t>month</a:t>
+                      </a:r>
+                      <a:endParaRPr lang="en-US" dirty="0"/>
+                    </a:p>
+                  </a:txBody>
+                  <a:tcPr/>
+                </a:tc>
+                <a:tc>
+                  <a:txBody>
+                    <a:bodyPr/>
+                    <a:lstStyle/>
+                    <a:p>
+                      <a:pPr marL="0" marR="0" lvl="0" indent="0" algn="l" defTabSz="914400" rtl="0" eaLnBrk="1" fontAlgn="auto" latinLnBrk="0" hangingPunct="1">
+                        <a:lnSpc>
+                          <a:spcPct val="100000"/>
+                        </a:lnSpc>
+                        <a:spcBef>
+                          <a:spcPts val="0"/>
+                        </a:spcBef>
+                        <a:spcAft>
+                          <a:spcPts val="0"/>
+                        </a:spcAft>
+                        <a:buClrTx/>
+                        <a:buSzTx/>
+                        <a:buFontTx/>
+                        <a:buNone/>
+                        <a:tabLst/>
+                        <a:defRPr/>
+                      </a:pPr>
+                      <a:r>
+                        <a:rPr lang="en-US" b="1" dirty="0"/>
+                        <a:t>salinity, month</a:t>
+                      </a:r>
+                    </a:p>
+                  </a:txBody>
+                  <a:tcPr/>
+                </a:tc>
+                <a:extLst>
+                  <a:ext uri="{0D108BD9-81ED-4DB2-BD59-A6C34878D82A}">
+                    <a16:rowId xmlns:a16="http://schemas.microsoft.com/office/drawing/2014/main" val="3886939038"/>
+                  </a:ext>
+                </a:extLst>
+              </a:tr>
+              <a:tr h="370840">
+                <a:tc>
+                  <a:txBody>
+                    <a:bodyPr/>
+                    <a:lstStyle/>
+                    <a:p>
+                      <a:r>
+                        <a:rPr lang="en-US" dirty="0"/>
+                        <a:t>P. </a:t>
+                      </a:r>
+                      <a:r>
+                        <a:rPr lang="en-US" dirty="0" err="1"/>
+                        <a:t>forebesi</a:t>
+                      </a:r>
+                      <a:endParaRPr lang="en-US" dirty="0"/>
+                    </a:p>
+                  </a:txBody>
+                  <a:tcPr/>
+                </a:tc>
+                <a:tc>
+                  <a:txBody>
+                    <a:bodyPr/>
+                    <a:lstStyle/>
+                    <a:p>
+                      <a:pPr marL="0" marR="0" lvl="0" indent="0" algn="l" defTabSz="914400" rtl="0" eaLnBrk="1" fontAlgn="auto" latinLnBrk="0" hangingPunct="1">
+                        <a:lnSpc>
+                          <a:spcPct val="100000"/>
+                        </a:lnSpc>
+                        <a:spcBef>
+                          <a:spcPts val="0"/>
+                        </a:spcBef>
+                        <a:spcAft>
+                          <a:spcPts val="0"/>
+                        </a:spcAft>
+                        <a:buClrTx/>
+                        <a:buSzTx/>
+                        <a:buFontTx/>
+                        <a:buNone/>
+                        <a:tabLst/>
+                        <a:defRPr/>
+                      </a:pPr>
+                      <a:r>
+                        <a:rPr lang="en-US" b="1" dirty="0"/>
+                        <a:t>salinity</a:t>
+                      </a:r>
+                      <a:r>
+                        <a:rPr lang="en-US" dirty="0"/>
+                        <a:t>, month</a:t>
+                      </a:r>
+                    </a:p>
+                  </a:txBody>
+                  <a:tcPr/>
+                </a:tc>
+                <a:tc>
+                  <a:txBody>
+                    <a:bodyPr/>
+                    <a:lstStyle/>
+                    <a:p>
+                      <a:pPr marL="0" marR="0" lvl="0" indent="0" algn="l" defTabSz="914400" rtl="0" eaLnBrk="1" fontAlgn="auto" latinLnBrk="0" hangingPunct="1">
+                        <a:lnSpc>
+                          <a:spcPct val="100000"/>
+                        </a:lnSpc>
+                        <a:spcBef>
+                          <a:spcPts val="0"/>
+                        </a:spcBef>
+                        <a:spcAft>
+                          <a:spcPts val="0"/>
+                        </a:spcAft>
+                        <a:buClrTx/>
+                        <a:buSzTx/>
+                        <a:buFontTx/>
+                        <a:buNone/>
+                        <a:tabLst/>
+                        <a:defRPr/>
+                      </a:pPr>
+                      <a:r>
+                        <a:rPr lang="en-US" b="1" dirty="0"/>
+                        <a:t>salinity, month</a:t>
+                      </a:r>
+                    </a:p>
+                  </a:txBody>
+                  <a:tcPr/>
+                </a:tc>
+                <a:extLst>
+                  <a:ext uri="{0D108BD9-81ED-4DB2-BD59-A6C34878D82A}">
+                    <a16:rowId xmlns:a16="http://schemas.microsoft.com/office/drawing/2014/main" val="4262865860"/>
+                  </a:ext>
+                </a:extLst>
+              </a:tr>
+            </a:tbl>
+          </a:graphicData>
+        </a:graphic>
+      </p:graphicFrame>
     </p:spTree>
     <p:extLst>
       <p:ext uri="{BB962C8B-B14F-4D97-AF65-F5344CB8AC3E}">
-        <p14:creationId xmlns:p14="http://schemas.microsoft.com/office/powerpoint/2010/main" val="3527320659"/>
+        <p14:creationId xmlns:p14="http://schemas.microsoft.com/office/powerpoint/2010/main" val="1539228942"/>
       </p:ext>
     </p:extLst>
   </p:cSld>
@@ -6125,10 +6430,10 @@
       </p:grpSpPr>
       <p:pic>
         <p:nvPicPr>
-          <p:cNvPr id="3" name="Picture 2">
-            <a:extLst>
-              <a:ext uri="{FF2B5EF4-FFF2-40B4-BE49-F238E27FC236}">
-                <a16:creationId xmlns:a16="http://schemas.microsoft.com/office/drawing/2014/main" id="{8747DB4E-0A6F-B892-9B94-6F0B5D5E5C79}"/>
+          <p:cNvPr id="5" name="Picture 4">
+            <a:extLst>
+              <a:ext uri="{FF2B5EF4-FFF2-40B4-BE49-F238E27FC236}">
+                <a16:creationId xmlns:a16="http://schemas.microsoft.com/office/drawing/2014/main" id="{6FD94798-2235-68DA-E129-A9242FE3A7C6}"/>
               </a:ext>
             </a:extLst>
           </p:cNvPr>
@@ -6150,8 +6455,280 @@
         </p:blipFill>
         <p:spPr>
           <a:xfrm>
+            <a:off x="98475" y="76147"/>
+            <a:ext cx="5029276" cy="3352851"/>
+          </a:xfrm>
+          <a:prstGeom prst="rect">
+            <a:avLst/>
+          </a:prstGeom>
+          <a:ln>
+            <a:solidFill>
+              <a:schemeClr val="tx1"/>
+            </a:solidFill>
+          </a:ln>
+        </p:spPr>
+      </p:pic>
+      <p:pic>
+        <p:nvPicPr>
+          <p:cNvPr id="9" name="Picture 8">
+            <a:extLst>
+              <a:ext uri="{FF2B5EF4-FFF2-40B4-BE49-F238E27FC236}">
+                <a16:creationId xmlns:a16="http://schemas.microsoft.com/office/drawing/2014/main" id="{F6B60D4E-DA31-C0DD-FDE6-81F66DFA2C05}"/>
+              </a:ext>
+            </a:extLst>
+          </p:cNvPr>
+          <p:cNvPicPr>
+            <a:picLocks noChangeAspect="1"/>
+          </p:cNvPicPr>
+          <p:nvPr/>
+        </p:nvPicPr>
+        <p:blipFill>
+          <a:blip r:embed="rId3">
+            <a:extLst>
+              <a:ext uri="{28A0092B-C50C-407E-A947-70E740481C1C}">
+                <a14:useLocalDpi xmlns:a14="http://schemas.microsoft.com/office/drawing/2010/main" val="0"/>
+              </a:ext>
+            </a:extLst>
+          </a:blip>
+          <a:srcRect/>
+          <a:stretch/>
+        </p:blipFill>
+        <p:spPr>
+          <a:xfrm>
+            <a:off x="5221346" y="0"/>
+            <a:ext cx="3429000" cy="3429000"/>
+          </a:xfrm>
+          <a:prstGeom prst="rect">
+            <a:avLst/>
+          </a:prstGeom>
+        </p:spPr>
+      </p:pic>
+      <p:pic>
+        <p:nvPicPr>
+          <p:cNvPr id="11" name="Picture 10">
+            <a:extLst>
+              <a:ext uri="{FF2B5EF4-FFF2-40B4-BE49-F238E27FC236}">
+                <a16:creationId xmlns:a16="http://schemas.microsoft.com/office/drawing/2014/main" id="{CE640AF2-FDA7-7D89-D2CD-7D5F32369E11}"/>
+              </a:ext>
+            </a:extLst>
+          </p:cNvPr>
+          <p:cNvPicPr>
+            <a:picLocks noChangeAspect="1"/>
+          </p:cNvPicPr>
+          <p:nvPr/>
+        </p:nvPicPr>
+        <p:blipFill>
+          <a:blip r:embed="rId4">
+            <a:extLst>
+              <a:ext uri="{28A0092B-C50C-407E-A947-70E740481C1C}">
+                <a14:useLocalDpi xmlns:a14="http://schemas.microsoft.com/office/drawing/2010/main" val="0"/>
+              </a:ext>
+            </a:extLst>
+          </a:blip>
+          <a:srcRect/>
+          <a:stretch/>
+        </p:blipFill>
+        <p:spPr>
+          <a:xfrm>
+            <a:off x="8763000" y="0"/>
+            <a:ext cx="3429000" cy="3429000"/>
+          </a:xfrm>
+          <a:prstGeom prst="rect">
+            <a:avLst/>
+          </a:prstGeom>
+        </p:spPr>
+      </p:pic>
+      <p:pic>
+        <p:nvPicPr>
+          <p:cNvPr id="14" name="Picture 13">
+            <a:extLst>
+              <a:ext uri="{FF2B5EF4-FFF2-40B4-BE49-F238E27FC236}">
+                <a16:creationId xmlns:a16="http://schemas.microsoft.com/office/drawing/2014/main" id="{C32ED9E6-D291-2EE3-C90D-3F8AB938467A}"/>
+              </a:ext>
+            </a:extLst>
+          </p:cNvPr>
+          <p:cNvPicPr>
+            <a:picLocks noChangeAspect="1"/>
+          </p:cNvPicPr>
+          <p:nvPr/>
+        </p:nvPicPr>
+        <p:blipFill>
+          <a:blip r:embed="rId5">
+            <a:extLst>
+              <a:ext uri="{28A0092B-C50C-407E-A947-70E740481C1C}">
+                <a14:useLocalDpi xmlns:a14="http://schemas.microsoft.com/office/drawing/2010/main" val="0"/>
+              </a:ext>
+            </a:extLst>
+          </a:blip>
+          <a:srcRect/>
+          <a:stretch/>
+        </p:blipFill>
+        <p:spPr>
+          <a:xfrm>
+            <a:off x="5221346" y="3428999"/>
+            <a:ext cx="3429001" cy="3429001"/>
+          </a:xfrm>
+          <a:prstGeom prst="rect">
+            <a:avLst/>
+          </a:prstGeom>
+        </p:spPr>
+      </p:pic>
+      <p:pic>
+        <p:nvPicPr>
+          <p:cNvPr id="18" name="Picture 17">
+            <a:extLst>
+              <a:ext uri="{FF2B5EF4-FFF2-40B4-BE49-F238E27FC236}">
+                <a16:creationId xmlns:a16="http://schemas.microsoft.com/office/drawing/2014/main" id="{D1AE3916-4792-67CE-6EF4-4E30E6EF82BD}"/>
+              </a:ext>
+            </a:extLst>
+          </p:cNvPr>
+          <p:cNvPicPr>
+            <a:picLocks noChangeAspect="1"/>
+          </p:cNvPicPr>
+          <p:nvPr/>
+        </p:nvPicPr>
+        <p:blipFill>
+          <a:blip r:embed="rId6">
+            <a:extLst>
+              <a:ext uri="{28A0092B-C50C-407E-A947-70E740481C1C}">
+                <a14:useLocalDpi xmlns:a14="http://schemas.microsoft.com/office/drawing/2010/main" val="0"/>
+              </a:ext>
+            </a:extLst>
+          </a:blip>
+          <a:srcRect/>
+          <a:stretch/>
+        </p:blipFill>
+        <p:spPr>
+          <a:xfrm>
+            <a:off x="8762998" y="3428998"/>
+            <a:ext cx="3429002" cy="3429002"/>
+          </a:xfrm>
+          <a:prstGeom prst="rect">
+            <a:avLst/>
+          </a:prstGeom>
+        </p:spPr>
+      </p:pic>
+      <p:sp>
+        <p:nvSpPr>
+          <p:cNvPr id="36" name="Rectangle 35">
+            <a:extLst>
+              <a:ext uri="{FF2B5EF4-FFF2-40B4-BE49-F238E27FC236}">
+                <a16:creationId xmlns:a16="http://schemas.microsoft.com/office/drawing/2014/main" id="{470BE9EB-0BE0-8E85-F236-34BA746076C6}"/>
+              </a:ext>
+            </a:extLst>
+          </p:cNvPr>
+          <p:cNvSpPr/>
+          <p:nvPr/>
+        </p:nvSpPr>
+        <p:spPr>
+          <a:xfrm>
+            <a:off x="7778022" y="3264156"/>
+            <a:ext cx="389850" cy="584775"/>
+          </a:xfrm>
+          <a:prstGeom prst="rect">
+            <a:avLst/>
+          </a:prstGeom>
+          <a:noFill/>
+        </p:spPr>
+        <p:txBody>
+          <a:bodyPr wrap="none" lIns="91440" tIns="45720" rIns="91440" bIns="45720">
+            <a:spAutoFit/>
+          </a:bodyPr>
+          <a:lstStyle/>
+          <a:p>
+            <a:pPr algn="ctr"/>
+            <a:r>
+              <a:rPr lang="en-US" sz="3200" b="0" i="0" u="none" strike="noStrike" cap="none" spc="0" dirty="0">
+                <a:ln w="0"/>
+                <a:solidFill>
+                  <a:schemeClr val="tx1"/>
+                </a:solidFill>
+                <a:effectLst>
+                  <a:outerShdw blurRad="38100" dist="19050" dir="2700000" algn="tl" rotWithShape="0">
+                    <a:schemeClr val="dk1">
+                      <a:alpha val="40000"/>
+                    </a:schemeClr>
+                  </a:outerShdw>
+                </a:effectLst>
+                <a:latin typeface="Calibri" panose="020F0502020204030204" pitchFamily="34" charset="0"/>
+              </a:rPr>
+              <a:t>*</a:t>
+            </a:r>
+            <a:endParaRPr lang="en-US" sz="3200" b="0" cap="none" spc="0" dirty="0">
+              <a:ln w="0"/>
+              <a:solidFill>
+                <a:schemeClr val="tx1"/>
+              </a:solidFill>
+              <a:effectLst>
+                <a:outerShdw blurRad="38100" dist="19050" dir="2700000" algn="tl" rotWithShape="0">
+                  <a:schemeClr val="dk1">
+                    <a:alpha val="40000"/>
+                  </a:schemeClr>
+                </a:outerShdw>
+              </a:effectLst>
+            </a:endParaRPr>
+          </a:p>
+        </p:txBody>
+      </p:sp>
+    </p:spTree>
+    <p:extLst>
+      <p:ext uri="{BB962C8B-B14F-4D97-AF65-F5344CB8AC3E}">
+        <p14:creationId xmlns:p14="http://schemas.microsoft.com/office/powerpoint/2010/main" val="3527320659"/>
+      </p:ext>
+    </p:extLst>
+  </p:cSld>
+  <p:clrMapOvr>
+    <a:masterClrMapping/>
+  </p:clrMapOvr>
+</p:sld>
+</file>
+
+<file path=ppt/slides/slide7.xml><?xml version="1.0" encoding="utf-8"?>
+<p:sld xmlns:a="http://schemas.openxmlformats.org/drawingml/2006/main" xmlns:r="http://schemas.openxmlformats.org/officeDocument/2006/relationships" xmlns:p="http://schemas.openxmlformats.org/presentationml/2006/main">
+  <p:cSld>
+    <p:spTree>
+      <p:nvGrpSpPr>
+        <p:cNvPr id="1" name=""/>
+        <p:cNvGrpSpPr/>
+        <p:nvPr/>
+      </p:nvGrpSpPr>
+      <p:grpSpPr>
+        <a:xfrm>
+          <a:off x="0" y="0"/>
+          <a:ext cx="0" cy="0"/>
+          <a:chOff x="0" y="0"/>
+          <a:chExt cx="0" cy="0"/>
+        </a:xfrm>
+      </p:grpSpPr>
+      <p:pic>
+        <p:nvPicPr>
+          <p:cNvPr id="3" name="Picture 2">
+            <a:extLst>
+              <a:ext uri="{FF2B5EF4-FFF2-40B4-BE49-F238E27FC236}">
+                <a16:creationId xmlns:a16="http://schemas.microsoft.com/office/drawing/2014/main" id="{8747DB4E-0A6F-B892-9B94-6F0B5D5E5C79}"/>
+              </a:ext>
+            </a:extLst>
+          </p:cNvPr>
+          <p:cNvPicPr>
+            <a:picLocks noChangeAspect="1"/>
+          </p:cNvPicPr>
+          <p:nvPr/>
+        </p:nvPicPr>
+        <p:blipFill>
+          <a:blip r:embed="rId2">
+            <a:extLst>
+              <a:ext uri="{28A0092B-C50C-407E-A947-70E740481C1C}">
+                <a14:useLocalDpi xmlns:a14="http://schemas.microsoft.com/office/drawing/2010/main" val="0"/>
+              </a:ext>
+            </a:extLst>
+          </a:blip>
+          <a:srcRect/>
+          <a:stretch/>
+        </p:blipFill>
+        <p:spPr>
+          <a:xfrm>
             <a:off x="609601" y="1"/>
-            <a:ext cx="4876800" cy="3048000"/>
+            <a:ext cx="4876800" cy="3047999"/>
           </a:xfrm>
           <a:prstGeom prst="rect">
             <a:avLst/>
@@ -6186,7 +6763,7 @@
         <p:spPr>
           <a:xfrm>
             <a:off x="6566785" y="0"/>
-            <a:ext cx="4876801" cy="3048001"/>
+            <a:ext cx="4876801" cy="3048000"/>
           </a:xfrm>
           <a:prstGeom prst="rect">
             <a:avLst/>
@@ -6221,7 +6798,7 @@
         <p:spPr>
           <a:xfrm>
             <a:off x="609601" y="3809998"/>
-            <a:ext cx="4876801" cy="3048001"/>
+            <a:ext cx="4876801" cy="3048000"/>
           </a:xfrm>
           <a:prstGeom prst="rect">
             <a:avLst/>
@@ -6256,7 +6833,7 @@
         <p:spPr>
           <a:xfrm>
             <a:off x="6705598" y="3809998"/>
-            <a:ext cx="4876801" cy="3048001"/>
+            <a:ext cx="4876801" cy="3048000"/>
           </a:xfrm>
           <a:prstGeom prst="rect">
             <a:avLst/>

</xml_diff>

<commit_message>
Fixed gam 4.1 to a binomial gam, was a glm
</commit_message>
<xml_diff>
--- a/PaperOutline_v1_2.pptx
+++ b/PaperOutline_v1_2.pptx
@@ -3885,10 +3885,6 @@
               <a:t>Are the env parameters for taxa changing, or moving?</a:t>
             </a:r>
           </a:p>
-          <a:p>
-            <a:pPr lvl="2"/>
-            <a:endParaRPr lang="en-US" dirty="0"/>
-          </a:p>
         </p:txBody>
       </p:sp>
     </p:spTree>
@@ -5993,7 +5989,7 @@
           <p:nvPr>
             <p:extLst>
               <p:ext uri="{D42A27DB-BD31-4B8C-83A1-F6EECF244321}">
-                <p14:modId xmlns:p14="http://schemas.microsoft.com/office/powerpoint/2010/main" val="1811759239"/>
+                <p14:modId xmlns:p14="http://schemas.microsoft.com/office/powerpoint/2010/main" val="1056179556"/>
               </p:ext>
             </p:extLst>
           </p:nvPr>
@@ -6204,7 +6200,7 @@
                       </a:pPr>
                       <a:r>
                         <a:rPr lang="en-US" b="1" dirty="0"/>
-                        <a:t>Salinity, month</a:t>
+                        <a:t>salinity, month</a:t>
                       </a:r>
                     </a:p>
                   </a:txBody>
@@ -6495,7 +6491,7 @@
         </p:blipFill>
         <p:spPr>
           <a:xfrm>
-            <a:off x="5221346" y="0"/>
+            <a:off x="5221346" y="-2"/>
             <a:ext cx="3429000" cy="3429000"/>
           </a:xfrm>
           <a:prstGeom prst="rect">

</xml_diff>

<commit_message>
Updates: removed "adult" from labels, ran daphnia m4.2 with station random effect
</commit_message>
<xml_diff>
--- a/PaperOutline_v1_2.pptx
+++ b/PaperOutline_v1_2.pptx
@@ -203,7 +203,7 @@
           <a:p>
             <a:fld id="{982D7E43-E401-43ED-ACCB-2C6410FE48A5}" type="datetimeFigureOut">
               <a:rPr lang="en-US" smtClean="0"/>
-              <a:t>8/1/2022</a:t>
+              <a:t>8/4/2022</a:t>
             </a:fld>
             <a:endParaRPr lang="en-US"/>
           </a:p>
@@ -704,7 +704,7 @@
           <a:p>
             <a:fld id="{C81EE8AC-7356-4E1A-8866-5ADEE4133E9C}" type="datetimeFigureOut">
               <a:rPr lang="en-US" smtClean="0"/>
-              <a:t>8/1/2022</a:t>
+              <a:t>8/4/2022</a:t>
             </a:fld>
             <a:endParaRPr lang="en-US"/>
           </a:p>
@@ -902,7 +902,7 @@
           <a:p>
             <a:fld id="{C81EE8AC-7356-4E1A-8866-5ADEE4133E9C}" type="datetimeFigureOut">
               <a:rPr lang="en-US" smtClean="0"/>
-              <a:t>8/1/2022</a:t>
+              <a:t>8/4/2022</a:t>
             </a:fld>
             <a:endParaRPr lang="en-US"/>
           </a:p>
@@ -1110,7 +1110,7 @@
           <a:p>
             <a:fld id="{C81EE8AC-7356-4E1A-8866-5ADEE4133E9C}" type="datetimeFigureOut">
               <a:rPr lang="en-US" smtClean="0"/>
-              <a:t>8/1/2022</a:t>
+              <a:t>8/4/2022</a:t>
             </a:fld>
             <a:endParaRPr lang="en-US"/>
           </a:p>
@@ -1308,7 +1308,7 @@
           <a:p>
             <a:fld id="{C81EE8AC-7356-4E1A-8866-5ADEE4133E9C}" type="datetimeFigureOut">
               <a:rPr lang="en-US" smtClean="0"/>
-              <a:t>8/1/2022</a:t>
+              <a:t>8/4/2022</a:t>
             </a:fld>
             <a:endParaRPr lang="en-US"/>
           </a:p>
@@ -1583,7 +1583,7 @@
           <a:p>
             <a:fld id="{C81EE8AC-7356-4E1A-8866-5ADEE4133E9C}" type="datetimeFigureOut">
               <a:rPr lang="en-US" smtClean="0"/>
-              <a:t>8/1/2022</a:t>
+              <a:t>8/4/2022</a:t>
             </a:fld>
             <a:endParaRPr lang="en-US"/>
           </a:p>
@@ -1848,7 +1848,7 @@
           <a:p>
             <a:fld id="{C81EE8AC-7356-4E1A-8866-5ADEE4133E9C}" type="datetimeFigureOut">
               <a:rPr lang="en-US" smtClean="0"/>
-              <a:t>8/1/2022</a:t>
+              <a:t>8/4/2022</a:t>
             </a:fld>
             <a:endParaRPr lang="en-US"/>
           </a:p>
@@ -2260,7 +2260,7 @@
           <a:p>
             <a:fld id="{C81EE8AC-7356-4E1A-8866-5ADEE4133E9C}" type="datetimeFigureOut">
               <a:rPr lang="en-US" smtClean="0"/>
-              <a:t>8/1/2022</a:t>
+              <a:t>8/4/2022</a:t>
             </a:fld>
             <a:endParaRPr lang="en-US"/>
           </a:p>
@@ -2401,7 +2401,7 @@
           <a:p>
             <a:fld id="{C81EE8AC-7356-4E1A-8866-5ADEE4133E9C}" type="datetimeFigureOut">
               <a:rPr lang="en-US" smtClean="0"/>
-              <a:t>8/1/2022</a:t>
+              <a:t>8/4/2022</a:t>
             </a:fld>
             <a:endParaRPr lang="en-US"/>
           </a:p>
@@ -2514,7 +2514,7 @@
           <a:p>
             <a:fld id="{C81EE8AC-7356-4E1A-8866-5ADEE4133E9C}" type="datetimeFigureOut">
               <a:rPr lang="en-US" smtClean="0"/>
-              <a:t>8/1/2022</a:t>
+              <a:t>8/4/2022</a:t>
             </a:fld>
             <a:endParaRPr lang="en-US"/>
           </a:p>
@@ -2825,7 +2825,7 @@
           <a:p>
             <a:fld id="{C81EE8AC-7356-4E1A-8866-5ADEE4133E9C}" type="datetimeFigureOut">
               <a:rPr lang="en-US" smtClean="0"/>
-              <a:t>8/1/2022</a:t>
+              <a:t>8/4/2022</a:t>
             </a:fld>
             <a:endParaRPr lang="en-US"/>
           </a:p>
@@ -3113,7 +3113,7 @@
           <a:p>
             <a:fld id="{C81EE8AC-7356-4E1A-8866-5ADEE4133E9C}" type="datetimeFigureOut">
               <a:rPr lang="en-US" smtClean="0"/>
-              <a:t>8/1/2022</a:t>
+              <a:t>8/4/2022</a:t>
             </a:fld>
             <a:endParaRPr lang="en-US"/>
           </a:p>
@@ -3354,7 +3354,7 @@
           <a:p>
             <a:fld id="{C81EE8AC-7356-4E1A-8866-5ADEE4133E9C}" type="datetimeFigureOut">
               <a:rPr lang="en-US" smtClean="0"/>
-              <a:t>8/1/2022</a:t>
+              <a:t>8/4/2022</a:t>
             </a:fld>
             <a:endParaRPr lang="en-US"/>
           </a:p>
@@ -3917,12 +3917,47 @@
           <a:chExt cx="0" cy="0"/>
         </a:xfrm>
       </p:grpSpPr>
+      <p:sp>
+        <p:nvSpPr>
+          <p:cNvPr id="21" name="Title 1">
+            <a:extLst>
+              <a:ext uri="{FF2B5EF4-FFF2-40B4-BE49-F238E27FC236}">
+                <a16:creationId xmlns:a16="http://schemas.microsoft.com/office/drawing/2014/main" id="{98CF50C0-332A-F6EB-10AD-038A7B447978}"/>
+              </a:ext>
+            </a:extLst>
+          </p:cNvPr>
+          <p:cNvSpPr>
+            <a:spLocks noGrp="1"/>
+          </p:cNvSpPr>
+          <p:nvPr>
+            <p:ph type="title"/>
+          </p:nvPr>
+        </p:nvSpPr>
+        <p:spPr>
+          <a:xfrm>
+            <a:off x="2362954" y="170595"/>
+            <a:ext cx="7620000" cy="538466"/>
+          </a:xfrm>
+        </p:spPr>
+        <p:txBody>
+          <a:bodyPr>
+            <a:normAutofit fontScale="90000"/>
+          </a:bodyPr>
+          <a:lstStyle/>
+          <a:p>
+            <a:r>
+              <a:rPr lang="en-US" dirty="0"/>
+              <a:t>Regional Drought Changes</a:t>
+            </a:r>
+          </a:p>
+        </p:txBody>
+      </p:sp>
       <p:pic>
         <p:nvPicPr>
-          <p:cNvPr id="10" name="Picture 9">
-            <a:extLst>
-              <a:ext uri="{FF2B5EF4-FFF2-40B4-BE49-F238E27FC236}">
-                <a16:creationId xmlns:a16="http://schemas.microsoft.com/office/drawing/2014/main" id="{4BA2A60A-0A95-7BF0-59CE-DE766804A5FE}"/>
+          <p:cNvPr id="8" name="Picture 7">
+            <a:extLst>
+              <a:ext uri="{FF2B5EF4-FFF2-40B4-BE49-F238E27FC236}">
+                <a16:creationId xmlns:a16="http://schemas.microsoft.com/office/drawing/2014/main" id="{D9B76EE9-E49A-92A2-B2AB-6E5D14DBD249}"/>
               </a:ext>
             </a:extLst>
           </p:cNvPr>
@@ -3944,8 +3979,8 @@
         </p:blipFill>
         <p:spPr>
           <a:xfrm>
-            <a:off x="7360445" y="165370"/>
-            <a:ext cx="4351506" cy="6527260"/>
+            <a:off x="2863794" y="767982"/>
+            <a:ext cx="5846323" cy="5846323"/>
           </a:xfrm>
           <a:prstGeom prst="rect">
             <a:avLst/>
@@ -3959,10 +3994,10 @@
       </p:pic>
       <p:sp>
         <p:nvSpPr>
-          <p:cNvPr id="12" name="Rectangle 11">
-            <a:extLst>
-              <a:ext uri="{FF2B5EF4-FFF2-40B4-BE49-F238E27FC236}">
-                <a16:creationId xmlns:a16="http://schemas.microsoft.com/office/drawing/2014/main" id="{94B61152-CFE8-1AA1-5165-9A7784581B6A}"/>
+          <p:cNvPr id="22" name="Rectangle 21">
+            <a:extLst>
+              <a:ext uri="{FF2B5EF4-FFF2-40B4-BE49-F238E27FC236}">
+                <a16:creationId xmlns:a16="http://schemas.microsoft.com/office/drawing/2014/main" id="{5342D929-30E8-F968-02F4-9BAB59E01340}"/>
               </a:ext>
             </a:extLst>
           </p:cNvPr>
@@ -3971,7 +4006,7 @@
         </p:nvSpPr>
         <p:spPr>
           <a:xfrm>
-            <a:off x="8041159" y="369652"/>
+            <a:off x="5848252" y="2728377"/>
             <a:ext cx="389850" cy="584775"/>
           </a:xfrm>
           <a:prstGeom prst="rect">
@@ -4021,10 +4056,10 @@
       </p:sp>
       <p:sp>
         <p:nvSpPr>
-          <p:cNvPr id="13" name="Rectangle 12">
-            <a:extLst>
-              <a:ext uri="{FF2B5EF4-FFF2-40B4-BE49-F238E27FC236}">
-                <a16:creationId xmlns:a16="http://schemas.microsoft.com/office/drawing/2014/main" id="{7ED5C623-B789-A96C-6A34-0505F5223A95}"/>
+          <p:cNvPr id="23" name="Rectangle 22">
+            <a:extLst>
+              <a:ext uri="{FF2B5EF4-FFF2-40B4-BE49-F238E27FC236}">
+                <a16:creationId xmlns:a16="http://schemas.microsoft.com/office/drawing/2014/main" id="{2AB111DB-FC09-3248-E3C6-8515548A25B8}"/>
               </a:ext>
             </a:extLst>
           </p:cNvPr>
@@ -4033,7 +4068,7 @@
         </p:nvSpPr>
         <p:spPr>
           <a:xfrm>
-            <a:off x="9092490" y="369652"/>
+            <a:off x="6781028" y="880916"/>
             <a:ext cx="389850" cy="584775"/>
           </a:xfrm>
           <a:prstGeom prst="rect">
@@ -4083,10 +4118,10 @@
       </p:sp>
       <p:sp>
         <p:nvSpPr>
-          <p:cNvPr id="17" name="Rectangle 16">
-            <a:extLst>
-              <a:ext uri="{FF2B5EF4-FFF2-40B4-BE49-F238E27FC236}">
-                <a16:creationId xmlns:a16="http://schemas.microsoft.com/office/drawing/2014/main" id="{AB5B347B-5710-3488-FFB6-28D378CE9F80}"/>
+          <p:cNvPr id="24" name="Rectangle 23">
+            <a:extLst>
+              <a:ext uri="{FF2B5EF4-FFF2-40B4-BE49-F238E27FC236}">
+                <a16:creationId xmlns:a16="http://schemas.microsoft.com/office/drawing/2014/main" id="{DB44AEED-A2FB-37BE-80D0-71782E8CE734}"/>
               </a:ext>
             </a:extLst>
           </p:cNvPr>
@@ -4095,7 +4130,7 @@
         </p:nvSpPr>
         <p:spPr>
           <a:xfrm>
-            <a:off x="8021703" y="1982109"/>
+            <a:off x="6781028" y="1783254"/>
             <a:ext cx="389850" cy="584775"/>
           </a:xfrm>
           <a:prstGeom prst="rect">
@@ -4145,10 +4180,10 @@
       </p:sp>
       <p:sp>
         <p:nvSpPr>
-          <p:cNvPr id="18" name="Rectangle 17">
-            <a:extLst>
-              <a:ext uri="{FF2B5EF4-FFF2-40B4-BE49-F238E27FC236}">
-                <a16:creationId xmlns:a16="http://schemas.microsoft.com/office/drawing/2014/main" id="{F4EAFD46-7C2B-72E2-C129-DCFFAA60520D}"/>
+          <p:cNvPr id="25" name="Rectangle 24">
+            <a:extLst>
+              <a:ext uri="{FF2B5EF4-FFF2-40B4-BE49-F238E27FC236}">
+                <a16:creationId xmlns:a16="http://schemas.microsoft.com/office/drawing/2014/main" id="{7667526A-F4FE-E617-E006-CEBBB95E3A2E}"/>
               </a:ext>
             </a:extLst>
           </p:cNvPr>
@@ -4157,7 +4192,7 @@
         </p:nvSpPr>
         <p:spPr>
           <a:xfrm>
-            <a:off x="9073034" y="2000396"/>
+            <a:off x="3966173" y="2786655"/>
             <a:ext cx="389850" cy="584775"/>
           </a:xfrm>
           <a:prstGeom prst="rect">
@@ -4207,10 +4242,10 @@
       </p:sp>
       <p:sp>
         <p:nvSpPr>
-          <p:cNvPr id="19" name="Rectangle 18">
-            <a:extLst>
-              <a:ext uri="{FF2B5EF4-FFF2-40B4-BE49-F238E27FC236}">
-                <a16:creationId xmlns:a16="http://schemas.microsoft.com/office/drawing/2014/main" id="{B36E15EB-7EE3-7486-E39B-6215B1E30414}"/>
+          <p:cNvPr id="27" name="Rectangle 26">
+            <a:extLst>
+              <a:ext uri="{FF2B5EF4-FFF2-40B4-BE49-F238E27FC236}">
+                <a16:creationId xmlns:a16="http://schemas.microsoft.com/office/drawing/2014/main" id="{EE1D553B-D4F3-142E-B066-1585BCD35E18}"/>
               </a:ext>
             </a:extLst>
           </p:cNvPr>
@@ -4219,7 +4254,7 @@
         </p:nvSpPr>
         <p:spPr>
           <a:xfrm>
-            <a:off x="9014669" y="5279431"/>
+            <a:off x="6791438" y="2685592"/>
             <a:ext cx="389850" cy="584775"/>
           </a:xfrm>
           <a:prstGeom prst="rect">
@@ -4269,10 +4304,10 @@
       </p:sp>
       <p:sp>
         <p:nvSpPr>
-          <p:cNvPr id="20" name="Rectangle 19">
-            <a:extLst>
-              <a:ext uri="{FF2B5EF4-FFF2-40B4-BE49-F238E27FC236}">
-                <a16:creationId xmlns:a16="http://schemas.microsoft.com/office/drawing/2014/main" id="{3B00010D-E62E-BB71-7A9B-E7BC0B1092C3}"/>
+          <p:cNvPr id="29" name="Rectangle 28">
+            <a:extLst>
+              <a:ext uri="{FF2B5EF4-FFF2-40B4-BE49-F238E27FC236}">
+                <a16:creationId xmlns:a16="http://schemas.microsoft.com/office/drawing/2014/main" id="{11D6FD58-17CA-B196-2202-518AD92EE179}"/>
               </a:ext>
             </a:extLst>
           </p:cNvPr>
@@ -4281,7 +4316,7 @@
         </p:nvSpPr>
         <p:spPr>
           <a:xfrm>
-            <a:off x="10108154" y="5279432"/>
+            <a:off x="6791438" y="3614004"/>
             <a:ext cx="389850" cy="584775"/>
           </a:xfrm>
           <a:prstGeom prst="rect">
@@ -4331,54 +4366,19 @@
       </p:sp>
       <p:sp>
         <p:nvSpPr>
-          <p:cNvPr id="21" name="Title 1">
-            <a:extLst>
-              <a:ext uri="{FF2B5EF4-FFF2-40B4-BE49-F238E27FC236}">
-                <a16:creationId xmlns:a16="http://schemas.microsoft.com/office/drawing/2014/main" id="{98CF50C0-332A-F6EB-10AD-038A7B447978}"/>
-              </a:ext>
-            </a:extLst>
-          </p:cNvPr>
-          <p:cNvSpPr>
-            <a:spLocks noGrp="1"/>
-          </p:cNvSpPr>
-          <p:nvPr>
-            <p:ph type="title"/>
-          </p:nvPr>
+          <p:cNvPr id="32" name="Rectangle 31">
+            <a:extLst>
+              <a:ext uri="{FF2B5EF4-FFF2-40B4-BE49-F238E27FC236}">
+                <a16:creationId xmlns:a16="http://schemas.microsoft.com/office/drawing/2014/main" id="{B93E15C7-3F37-CDF2-4F77-2FB6AF1F90B9}"/>
+              </a:ext>
+            </a:extLst>
+          </p:cNvPr>
+          <p:cNvSpPr/>
+          <p:nvPr/>
         </p:nvSpPr>
         <p:spPr>
           <a:xfrm>
-            <a:off x="0" y="25740"/>
-            <a:ext cx="7620000" cy="538466"/>
-          </a:xfrm>
-        </p:spPr>
-        <p:txBody>
-          <a:bodyPr>
-            <a:normAutofit fontScale="90000"/>
-          </a:bodyPr>
-          <a:lstStyle/>
-          <a:p>
-            <a:r>
-              <a:rPr lang="en-US" dirty="0"/>
-              <a:t>Regional Drought Changes</a:t>
-            </a:r>
-          </a:p>
-        </p:txBody>
-      </p:sp>
-      <p:sp>
-        <p:nvSpPr>
-          <p:cNvPr id="14" name="Rectangle 13">
-            <a:extLst>
-              <a:ext uri="{FF2B5EF4-FFF2-40B4-BE49-F238E27FC236}">
-                <a16:creationId xmlns:a16="http://schemas.microsoft.com/office/drawing/2014/main" id="{D9F2107A-C69C-6BA3-A9C0-5CD1A5B89845}"/>
-              </a:ext>
-            </a:extLst>
-          </p:cNvPr>
-          <p:cNvSpPr/>
-          <p:nvPr/>
-        </p:nvSpPr>
-        <p:spPr>
-          <a:xfrm>
-            <a:off x="11211435" y="1988204"/>
+            <a:off x="5847643" y="1799891"/>
             <a:ext cx="389850" cy="584775"/>
           </a:xfrm>
           <a:prstGeom prst="rect">
@@ -4428,10 +4428,10 @@
       </p:sp>
       <p:sp>
         <p:nvSpPr>
-          <p:cNvPr id="15" name="Rectangle 14">
-            <a:extLst>
-              <a:ext uri="{FF2B5EF4-FFF2-40B4-BE49-F238E27FC236}">
-                <a16:creationId xmlns:a16="http://schemas.microsoft.com/office/drawing/2014/main" id="{F77F5834-49E5-F61B-FBBB-1ED9EE684CFC}"/>
+          <p:cNvPr id="33" name="Rectangle 32">
+            <a:extLst>
+              <a:ext uri="{FF2B5EF4-FFF2-40B4-BE49-F238E27FC236}">
+                <a16:creationId xmlns:a16="http://schemas.microsoft.com/office/drawing/2014/main" id="{6FD2C49A-8A6E-2B3F-53C7-35CDD441FFF9}"/>
               </a:ext>
             </a:extLst>
           </p:cNvPr>
@@ -4440,543 +4440,7 @@
         </p:nvSpPr>
         <p:spPr>
           <a:xfrm>
-            <a:off x="10160104" y="1998747"/>
-            <a:ext cx="389850" cy="584775"/>
-          </a:xfrm>
-          <a:prstGeom prst="rect">
-            <a:avLst/>
-          </a:prstGeom>
-          <a:noFill/>
-        </p:spPr>
-        <p:txBody>
-          <a:bodyPr wrap="none" lIns="91440" tIns="45720" rIns="91440" bIns="45720">
-            <a:spAutoFit/>
-          </a:bodyPr>
-          <a:lstStyle/>
-          <a:p>
-            <a:pPr algn="ctr"/>
-            <a:r>
-              <a:rPr lang="en-US" sz="3200" b="0" i="0" u="none" strike="noStrike" cap="none" spc="0" dirty="0">
-                <a:ln w="0"/>
-                <a:solidFill>
-                  <a:schemeClr val="tx1"/>
-                </a:solidFill>
-                <a:effectLst>
-                  <a:outerShdw blurRad="38100" dist="19050" dir="2700000" algn="tl" rotWithShape="0">
-                    <a:schemeClr val="dk1">
-                      <a:alpha val="40000"/>
-                    </a:schemeClr>
-                  </a:outerShdw>
-                </a:effectLst>
-                <a:latin typeface="Calibri" panose="020F0502020204030204" pitchFamily="34" charset="0"/>
-              </a:rPr>
-              <a:t>*</a:t>
-            </a:r>
-            <a:endParaRPr lang="en-US" sz="3200" b="0" cap="none" spc="0" dirty="0">
-              <a:ln w="0"/>
-              <a:solidFill>
-                <a:schemeClr val="tx1"/>
-              </a:solidFill>
-              <a:effectLst>
-                <a:outerShdw blurRad="38100" dist="19050" dir="2700000" algn="tl" rotWithShape="0">
-                  <a:schemeClr val="dk1">
-                    <a:alpha val="40000"/>
-                  </a:schemeClr>
-                </a:outerShdw>
-              </a:effectLst>
-            </a:endParaRPr>
-          </a:p>
-        </p:txBody>
-      </p:sp>
-      <p:pic>
-        <p:nvPicPr>
-          <p:cNvPr id="8" name="Picture 7">
-            <a:extLst>
-              <a:ext uri="{FF2B5EF4-FFF2-40B4-BE49-F238E27FC236}">
-                <a16:creationId xmlns:a16="http://schemas.microsoft.com/office/drawing/2014/main" id="{D9B76EE9-E49A-92A2-B2AB-6E5D14DBD249}"/>
-              </a:ext>
-            </a:extLst>
-          </p:cNvPr>
-          <p:cNvPicPr>
-            <a:picLocks noChangeAspect="1"/>
-          </p:cNvPicPr>
-          <p:nvPr/>
-        </p:nvPicPr>
-        <p:blipFill>
-          <a:blip r:embed="rId4">
-            <a:extLst>
-              <a:ext uri="{28A0092B-C50C-407E-A947-70E740481C1C}">
-                <a14:useLocalDpi xmlns:a14="http://schemas.microsoft.com/office/drawing/2010/main" val="0"/>
-              </a:ext>
-            </a:extLst>
-          </a:blip>
-          <a:srcRect/>
-          <a:stretch/>
-        </p:blipFill>
-        <p:spPr>
-          <a:xfrm>
-            <a:off x="500840" y="623127"/>
-            <a:ext cx="5846323" cy="5846323"/>
-          </a:xfrm>
-          <a:prstGeom prst="rect">
-            <a:avLst/>
-          </a:prstGeom>
-          <a:ln>
-            <a:solidFill>
-              <a:schemeClr val="tx1"/>
-            </a:solidFill>
-          </a:ln>
-        </p:spPr>
-      </p:pic>
-      <p:sp>
-        <p:nvSpPr>
-          <p:cNvPr id="22" name="Rectangle 21">
-            <a:extLst>
-              <a:ext uri="{FF2B5EF4-FFF2-40B4-BE49-F238E27FC236}">
-                <a16:creationId xmlns:a16="http://schemas.microsoft.com/office/drawing/2014/main" id="{5342D929-30E8-F968-02F4-9BAB59E01340}"/>
-              </a:ext>
-            </a:extLst>
-          </p:cNvPr>
-          <p:cNvSpPr/>
-          <p:nvPr/>
-        </p:nvSpPr>
-        <p:spPr>
-          <a:xfrm>
-            <a:off x="3485298" y="2583522"/>
-            <a:ext cx="389850" cy="584775"/>
-          </a:xfrm>
-          <a:prstGeom prst="rect">
-            <a:avLst/>
-          </a:prstGeom>
-          <a:noFill/>
-        </p:spPr>
-        <p:txBody>
-          <a:bodyPr wrap="none" lIns="91440" tIns="45720" rIns="91440" bIns="45720">
-            <a:spAutoFit/>
-          </a:bodyPr>
-          <a:lstStyle/>
-          <a:p>
-            <a:pPr algn="ctr"/>
-            <a:r>
-              <a:rPr lang="en-US" sz="3200" b="0" i="0" u="none" strike="noStrike" cap="none" spc="0" dirty="0">
-                <a:ln w="0"/>
-                <a:solidFill>
-                  <a:schemeClr val="tx1"/>
-                </a:solidFill>
-                <a:effectLst>
-                  <a:outerShdw blurRad="38100" dist="19050" dir="2700000" algn="tl" rotWithShape="0">
-                    <a:schemeClr val="dk1">
-                      <a:alpha val="40000"/>
-                    </a:schemeClr>
-                  </a:outerShdw>
-                </a:effectLst>
-                <a:latin typeface="Calibri" panose="020F0502020204030204" pitchFamily="34" charset="0"/>
-              </a:rPr>
-              <a:t>*</a:t>
-            </a:r>
-            <a:endParaRPr lang="en-US" sz="3200" b="0" cap="none" spc="0" dirty="0">
-              <a:ln w="0"/>
-              <a:solidFill>
-                <a:schemeClr val="tx1"/>
-              </a:solidFill>
-              <a:effectLst>
-                <a:outerShdw blurRad="38100" dist="19050" dir="2700000" algn="tl" rotWithShape="0">
-                  <a:schemeClr val="dk1">
-                    <a:alpha val="40000"/>
-                  </a:schemeClr>
-                </a:outerShdw>
-              </a:effectLst>
-            </a:endParaRPr>
-          </a:p>
-        </p:txBody>
-      </p:sp>
-      <p:sp>
-        <p:nvSpPr>
-          <p:cNvPr id="23" name="Rectangle 22">
-            <a:extLst>
-              <a:ext uri="{FF2B5EF4-FFF2-40B4-BE49-F238E27FC236}">
-                <a16:creationId xmlns:a16="http://schemas.microsoft.com/office/drawing/2014/main" id="{2AB111DB-FC09-3248-E3C6-8515548A25B8}"/>
-              </a:ext>
-            </a:extLst>
-          </p:cNvPr>
-          <p:cNvSpPr/>
-          <p:nvPr/>
-        </p:nvSpPr>
-        <p:spPr>
-          <a:xfrm>
-            <a:off x="4418074" y="736061"/>
-            <a:ext cx="389850" cy="584775"/>
-          </a:xfrm>
-          <a:prstGeom prst="rect">
-            <a:avLst/>
-          </a:prstGeom>
-          <a:noFill/>
-        </p:spPr>
-        <p:txBody>
-          <a:bodyPr wrap="none" lIns="91440" tIns="45720" rIns="91440" bIns="45720">
-            <a:spAutoFit/>
-          </a:bodyPr>
-          <a:lstStyle/>
-          <a:p>
-            <a:pPr algn="ctr"/>
-            <a:r>
-              <a:rPr lang="en-US" sz="3200" b="0" i="0" u="none" strike="noStrike" cap="none" spc="0" dirty="0">
-                <a:ln w="0"/>
-                <a:solidFill>
-                  <a:schemeClr val="tx1"/>
-                </a:solidFill>
-                <a:effectLst>
-                  <a:outerShdw blurRad="38100" dist="19050" dir="2700000" algn="tl" rotWithShape="0">
-                    <a:schemeClr val="dk1">
-                      <a:alpha val="40000"/>
-                    </a:schemeClr>
-                  </a:outerShdw>
-                </a:effectLst>
-                <a:latin typeface="Calibri" panose="020F0502020204030204" pitchFamily="34" charset="0"/>
-              </a:rPr>
-              <a:t>*</a:t>
-            </a:r>
-            <a:endParaRPr lang="en-US" sz="3200" b="0" cap="none" spc="0" dirty="0">
-              <a:ln w="0"/>
-              <a:solidFill>
-                <a:schemeClr val="tx1"/>
-              </a:solidFill>
-              <a:effectLst>
-                <a:outerShdw blurRad="38100" dist="19050" dir="2700000" algn="tl" rotWithShape="0">
-                  <a:schemeClr val="dk1">
-                    <a:alpha val="40000"/>
-                  </a:schemeClr>
-                </a:outerShdw>
-              </a:effectLst>
-            </a:endParaRPr>
-          </a:p>
-        </p:txBody>
-      </p:sp>
-      <p:sp>
-        <p:nvSpPr>
-          <p:cNvPr id="24" name="Rectangle 23">
-            <a:extLst>
-              <a:ext uri="{FF2B5EF4-FFF2-40B4-BE49-F238E27FC236}">
-                <a16:creationId xmlns:a16="http://schemas.microsoft.com/office/drawing/2014/main" id="{DB44AEED-A2FB-37BE-80D0-71782E8CE734}"/>
-              </a:ext>
-            </a:extLst>
-          </p:cNvPr>
-          <p:cNvSpPr/>
-          <p:nvPr/>
-        </p:nvSpPr>
-        <p:spPr>
-          <a:xfrm>
-            <a:off x="4418074" y="1638399"/>
-            <a:ext cx="389850" cy="584775"/>
-          </a:xfrm>
-          <a:prstGeom prst="rect">
-            <a:avLst/>
-          </a:prstGeom>
-          <a:noFill/>
-        </p:spPr>
-        <p:txBody>
-          <a:bodyPr wrap="none" lIns="91440" tIns="45720" rIns="91440" bIns="45720">
-            <a:spAutoFit/>
-          </a:bodyPr>
-          <a:lstStyle/>
-          <a:p>
-            <a:pPr algn="ctr"/>
-            <a:r>
-              <a:rPr lang="en-US" sz="3200" b="0" i="0" u="none" strike="noStrike" cap="none" spc="0" dirty="0">
-                <a:ln w="0"/>
-                <a:solidFill>
-                  <a:schemeClr val="tx1"/>
-                </a:solidFill>
-                <a:effectLst>
-                  <a:outerShdw blurRad="38100" dist="19050" dir="2700000" algn="tl" rotWithShape="0">
-                    <a:schemeClr val="dk1">
-                      <a:alpha val="40000"/>
-                    </a:schemeClr>
-                  </a:outerShdw>
-                </a:effectLst>
-                <a:latin typeface="Calibri" panose="020F0502020204030204" pitchFamily="34" charset="0"/>
-              </a:rPr>
-              <a:t>*</a:t>
-            </a:r>
-            <a:endParaRPr lang="en-US" sz="3200" b="0" cap="none" spc="0" dirty="0">
-              <a:ln w="0"/>
-              <a:solidFill>
-                <a:schemeClr val="tx1"/>
-              </a:solidFill>
-              <a:effectLst>
-                <a:outerShdw blurRad="38100" dist="19050" dir="2700000" algn="tl" rotWithShape="0">
-                  <a:schemeClr val="dk1">
-                    <a:alpha val="40000"/>
-                  </a:schemeClr>
-                </a:outerShdw>
-              </a:effectLst>
-            </a:endParaRPr>
-          </a:p>
-        </p:txBody>
-      </p:sp>
-      <p:sp>
-        <p:nvSpPr>
-          <p:cNvPr id="25" name="Rectangle 24">
-            <a:extLst>
-              <a:ext uri="{FF2B5EF4-FFF2-40B4-BE49-F238E27FC236}">
-                <a16:creationId xmlns:a16="http://schemas.microsoft.com/office/drawing/2014/main" id="{7667526A-F4FE-E617-E006-CEBBB95E3A2E}"/>
-              </a:ext>
-            </a:extLst>
-          </p:cNvPr>
-          <p:cNvSpPr/>
-          <p:nvPr/>
-        </p:nvSpPr>
-        <p:spPr>
-          <a:xfrm>
-            <a:off x="1603219" y="2641800"/>
-            <a:ext cx="389850" cy="584775"/>
-          </a:xfrm>
-          <a:prstGeom prst="rect">
-            <a:avLst/>
-          </a:prstGeom>
-          <a:noFill/>
-        </p:spPr>
-        <p:txBody>
-          <a:bodyPr wrap="none" lIns="91440" tIns="45720" rIns="91440" bIns="45720">
-            <a:spAutoFit/>
-          </a:bodyPr>
-          <a:lstStyle/>
-          <a:p>
-            <a:pPr algn="ctr"/>
-            <a:r>
-              <a:rPr lang="en-US" sz="3200" b="0" i="0" u="none" strike="noStrike" cap="none" spc="0" dirty="0">
-                <a:ln w="0"/>
-                <a:solidFill>
-                  <a:schemeClr val="tx1"/>
-                </a:solidFill>
-                <a:effectLst>
-                  <a:outerShdw blurRad="38100" dist="19050" dir="2700000" algn="tl" rotWithShape="0">
-                    <a:schemeClr val="dk1">
-                      <a:alpha val="40000"/>
-                    </a:schemeClr>
-                  </a:outerShdw>
-                </a:effectLst>
-                <a:latin typeface="Calibri" panose="020F0502020204030204" pitchFamily="34" charset="0"/>
-              </a:rPr>
-              <a:t>*</a:t>
-            </a:r>
-            <a:endParaRPr lang="en-US" sz="3200" b="0" cap="none" spc="0" dirty="0">
-              <a:ln w="0"/>
-              <a:solidFill>
-                <a:schemeClr val="tx1"/>
-              </a:solidFill>
-              <a:effectLst>
-                <a:outerShdw blurRad="38100" dist="19050" dir="2700000" algn="tl" rotWithShape="0">
-                  <a:schemeClr val="dk1">
-                    <a:alpha val="40000"/>
-                  </a:schemeClr>
-                </a:outerShdw>
-              </a:effectLst>
-            </a:endParaRPr>
-          </a:p>
-        </p:txBody>
-      </p:sp>
-      <p:sp>
-        <p:nvSpPr>
-          <p:cNvPr id="27" name="Rectangle 26">
-            <a:extLst>
-              <a:ext uri="{FF2B5EF4-FFF2-40B4-BE49-F238E27FC236}">
-                <a16:creationId xmlns:a16="http://schemas.microsoft.com/office/drawing/2014/main" id="{EE1D553B-D4F3-142E-B066-1585BCD35E18}"/>
-              </a:ext>
-            </a:extLst>
-          </p:cNvPr>
-          <p:cNvSpPr/>
-          <p:nvPr/>
-        </p:nvSpPr>
-        <p:spPr>
-          <a:xfrm>
-            <a:off x="4428484" y="2540737"/>
-            <a:ext cx="389850" cy="584775"/>
-          </a:xfrm>
-          <a:prstGeom prst="rect">
-            <a:avLst/>
-          </a:prstGeom>
-          <a:noFill/>
-        </p:spPr>
-        <p:txBody>
-          <a:bodyPr wrap="none" lIns="91440" tIns="45720" rIns="91440" bIns="45720">
-            <a:spAutoFit/>
-          </a:bodyPr>
-          <a:lstStyle/>
-          <a:p>
-            <a:pPr algn="ctr"/>
-            <a:r>
-              <a:rPr lang="en-US" sz="3200" b="0" i="0" u="none" strike="noStrike" cap="none" spc="0" dirty="0">
-                <a:ln w="0"/>
-                <a:solidFill>
-                  <a:schemeClr val="tx1"/>
-                </a:solidFill>
-                <a:effectLst>
-                  <a:outerShdw blurRad="38100" dist="19050" dir="2700000" algn="tl" rotWithShape="0">
-                    <a:schemeClr val="dk1">
-                      <a:alpha val="40000"/>
-                    </a:schemeClr>
-                  </a:outerShdw>
-                </a:effectLst>
-                <a:latin typeface="Calibri" panose="020F0502020204030204" pitchFamily="34" charset="0"/>
-              </a:rPr>
-              <a:t>*</a:t>
-            </a:r>
-            <a:endParaRPr lang="en-US" sz="3200" b="0" cap="none" spc="0" dirty="0">
-              <a:ln w="0"/>
-              <a:solidFill>
-                <a:schemeClr val="tx1"/>
-              </a:solidFill>
-              <a:effectLst>
-                <a:outerShdw blurRad="38100" dist="19050" dir="2700000" algn="tl" rotWithShape="0">
-                  <a:schemeClr val="dk1">
-                    <a:alpha val="40000"/>
-                  </a:schemeClr>
-                </a:outerShdw>
-              </a:effectLst>
-            </a:endParaRPr>
-          </a:p>
-        </p:txBody>
-      </p:sp>
-      <p:sp>
-        <p:nvSpPr>
-          <p:cNvPr id="29" name="Rectangle 28">
-            <a:extLst>
-              <a:ext uri="{FF2B5EF4-FFF2-40B4-BE49-F238E27FC236}">
-                <a16:creationId xmlns:a16="http://schemas.microsoft.com/office/drawing/2014/main" id="{11D6FD58-17CA-B196-2202-518AD92EE179}"/>
-              </a:ext>
-            </a:extLst>
-          </p:cNvPr>
-          <p:cNvSpPr/>
-          <p:nvPr/>
-        </p:nvSpPr>
-        <p:spPr>
-          <a:xfrm>
-            <a:off x="4428484" y="3469149"/>
-            <a:ext cx="389850" cy="584775"/>
-          </a:xfrm>
-          <a:prstGeom prst="rect">
-            <a:avLst/>
-          </a:prstGeom>
-          <a:noFill/>
-        </p:spPr>
-        <p:txBody>
-          <a:bodyPr wrap="none" lIns="91440" tIns="45720" rIns="91440" bIns="45720">
-            <a:spAutoFit/>
-          </a:bodyPr>
-          <a:lstStyle/>
-          <a:p>
-            <a:pPr algn="ctr"/>
-            <a:r>
-              <a:rPr lang="en-US" sz="3200" b="0" i="0" u="none" strike="noStrike" cap="none" spc="0" dirty="0">
-                <a:ln w="0"/>
-                <a:solidFill>
-                  <a:schemeClr val="tx1"/>
-                </a:solidFill>
-                <a:effectLst>
-                  <a:outerShdw blurRad="38100" dist="19050" dir="2700000" algn="tl" rotWithShape="0">
-                    <a:schemeClr val="dk1">
-                      <a:alpha val="40000"/>
-                    </a:schemeClr>
-                  </a:outerShdw>
-                </a:effectLst>
-                <a:latin typeface="Calibri" panose="020F0502020204030204" pitchFamily="34" charset="0"/>
-              </a:rPr>
-              <a:t>*</a:t>
-            </a:r>
-            <a:endParaRPr lang="en-US" sz="3200" b="0" cap="none" spc="0" dirty="0">
-              <a:ln w="0"/>
-              <a:solidFill>
-                <a:schemeClr val="tx1"/>
-              </a:solidFill>
-              <a:effectLst>
-                <a:outerShdw blurRad="38100" dist="19050" dir="2700000" algn="tl" rotWithShape="0">
-                  <a:schemeClr val="dk1">
-                    <a:alpha val="40000"/>
-                  </a:schemeClr>
-                </a:outerShdw>
-              </a:effectLst>
-            </a:endParaRPr>
-          </a:p>
-        </p:txBody>
-      </p:sp>
-      <p:sp>
-        <p:nvSpPr>
-          <p:cNvPr id="32" name="Rectangle 31">
-            <a:extLst>
-              <a:ext uri="{FF2B5EF4-FFF2-40B4-BE49-F238E27FC236}">
-                <a16:creationId xmlns:a16="http://schemas.microsoft.com/office/drawing/2014/main" id="{B93E15C7-3F37-CDF2-4F77-2FB6AF1F90B9}"/>
-              </a:ext>
-            </a:extLst>
-          </p:cNvPr>
-          <p:cNvSpPr/>
-          <p:nvPr/>
-        </p:nvSpPr>
-        <p:spPr>
-          <a:xfrm>
-            <a:off x="3484689" y="1655036"/>
-            <a:ext cx="389850" cy="584775"/>
-          </a:xfrm>
-          <a:prstGeom prst="rect">
-            <a:avLst/>
-          </a:prstGeom>
-          <a:noFill/>
-        </p:spPr>
-        <p:txBody>
-          <a:bodyPr wrap="none" lIns="91440" tIns="45720" rIns="91440" bIns="45720">
-            <a:spAutoFit/>
-          </a:bodyPr>
-          <a:lstStyle/>
-          <a:p>
-            <a:pPr algn="ctr"/>
-            <a:r>
-              <a:rPr lang="en-US" sz="3200" b="0" i="0" u="none" strike="noStrike" cap="none" spc="0" dirty="0">
-                <a:ln w="0"/>
-                <a:solidFill>
-                  <a:schemeClr val="tx1"/>
-                </a:solidFill>
-                <a:effectLst>
-                  <a:outerShdw blurRad="38100" dist="19050" dir="2700000" algn="tl" rotWithShape="0">
-                    <a:schemeClr val="dk1">
-                      <a:alpha val="40000"/>
-                    </a:schemeClr>
-                  </a:outerShdw>
-                </a:effectLst>
-                <a:latin typeface="Calibri" panose="020F0502020204030204" pitchFamily="34" charset="0"/>
-              </a:rPr>
-              <a:t>*</a:t>
-            </a:r>
-            <a:endParaRPr lang="en-US" sz="3200" b="0" cap="none" spc="0" dirty="0">
-              <a:ln w="0"/>
-              <a:solidFill>
-                <a:schemeClr val="tx1"/>
-              </a:solidFill>
-              <a:effectLst>
-                <a:outerShdw blurRad="38100" dist="19050" dir="2700000" algn="tl" rotWithShape="0">
-                  <a:schemeClr val="dk1">
-                    <a:alpha val="40000"/>
-                  </a:schemeClr>
-                </a:outerShdw>
-              </a:effectLst>
-            </a:endParaRPr>
-          </a:p>
-        </p:txBody>
-      </p:sp>
-      <p:sp>
-        <p:nvSpPr>
-          <p:cNvPr id="33" name="Rectangle 32">
-            <a:extLst>
-              <a:ext uri="{FF2B5EF4-FFF2-40B4-BE49-F238E27FC236}">
-                <a16:creationId xmlns:a16="http://schemas.microsoft.com/office/drawing/2014/main" id="{6FD2C49A-8A6E-2B3F-53C7-35CDD441FFF9}"/>
-              </a:ext>
-            </a:extLst>
-          </p:cNvPr>
-          <p:cNvSpPr/>
-          <p:nvPr/>
-        </p:nvSpPr>
-        <p:spPr>
-          <a:xfrm>
-            <a:off x="1603219" y="3546288"/>
+            <a:off x="3966173" y="3691143"/>
             <a:ext cx="389850" cy="584775"/>
           </a:xfrm>
           <a:prstGeom prst="rect">

</xml_diff>